<commit_message>
The images were updated according to the changes in DB
</commit_message>
<xml_diff>
--- a/images/statistics_table.pptx
+++ b/images/statistics_table.pptx
@@ -208,7 +208,7 @@
           <a:p>
             <a:fld id="{C571D33F-B151-5442-9D79-DA0A881D815F}" type="datetimeFigureOut">
               <a:rPr lang="en-US" smtClean="0"/>
-              <a:t>8/14/19</a:t>
+              <a:t>10/11/19</a:t>
             </a:fld>
             <a:endParaRPr lang="en-US"/>
           </a:p>
@@ -746,7 +746,7 @@
           <a:p>
             <a:fld id="{01197F44-DB72-474A-9754-31703E05C006}" type="datetimeFigureOut">
               <a:rPr lang="en-US" smtClean="0"/>
-              <a:t>8/14/19</a:t>
+              <a:t>10/11/19</a:t>
             </a:fld>
             <a:endParaRPr lang="en-US"/>
           </a:p>
@@ -916,7 +916,7 @@
           <a:p>
             <a:fld id="{01197F44-DB72-474A-9754-31703E05C006}" type="datetimeFigureOut">
               <a:rPr lang="en-US" smtClean="0"/>
-              <a:t>8/14/19</a:t>
+              <a:t>10/11/19</a:t>
             </a:fld>
             <a:endParaRPr lang="en-US"/>
           </a:p>
@@ -1096,7 +1096,7 @@
           <a:p>
             <a:fld id="{01197F44-DB72-474A-9754-31703E05C006}" type="datetimeFigureOut">
               <a:rPr lang="en-US" smtClean="0"/>
-              <a:t>8/14/19</a:t>
+              <a:t>10/11/19</a:t>
             </a:fld>
             <a:endParaRPr lang="en-US"/>
           </a:p>
@@ -1266,7 +1266,7 @@
           <a:p>
             <a:fld id="{01197F44-DB72-474A-9754-31703E05C006}" type="datetimeFigureOut">
               <a:rPr lang="en-US" smtClean="0"/>
-              <a:t>8/14/19</a:t>
+              <a:t>10/11/19</a:t>
             </a:fld>
             <a:endParaRPr lang="en-US"/>
           </a:p>
@@ -1512,7 +1512,7 @@
           <a:p>
             <a:fld id="{01197F44-DB72-474A-9754-31703E05C006}" type="datetimeFigureOut">
               <a:rPr lang="en-US" smtClean="0"/>
-              <a:t>8/14/19</a:t>
+              <a:t>10/11/19</a:t>
             </a:fld>
             <a:endParaRPr lang="en-US"/>
           </a:p>
@@ -1800,7 +1800,7 @@
           <a:p>
             <a:fld id="{01197F44-DB72-474A-9754-31703E05C006}" type="datetimeFigureOut">
               <a:rPr lang="en-US" smtClean="0"/>
-              <a:t>8/14/19</a:t>
+              <a:t>10/11/19</a:t>
             </a:fld>
             <a:endParaRPr lang="en-US"/>
           </a:p>
@@ -2222,7 +2222,7 @@
           <a:p>
             <a:fld id="{01197F44-DB72-474A-9754-31703E05C006}" type="datetimeFigureOut">
               <a:rPr lang="en-US" smtClean="0"/>
-              <a:t>8/14/19</a:t>
+              <a:t>10/11/19</a:t>
             </a:fld>
             <a:endParaRPr lang="en-US"/>
           </a:p>
@@ -2340,7 +2340,7 @@
           <a:p>
             <a:fld id="{01197F44-DB72-474A-9754-31703E05C006}" type="datetimeFigureOut">
               <a:rPr lang="en-US" smtClean="0"/>
-              <a:t>8/14/19</a:t>
+              <a:t>10/11/19</a:t>
             </a:fld>
             <a:endParaRPr lang="en-US"/>
           </a:p>
@@ -2435,7 +2435,7 @@
           <a:p>
             <a:fld id="{01197F44-DB72-474A-9754-31703E05C006}" type="datetimeFigureOut">
               <a:rPr lang="en-US" smtClean="0"/>
-              <a:t>8/14/19</a:t>
+              <a:t>10/11/19</a:t>
             </a:fld>
             <a:endParaRPr lang="en-US"/>
           </a:p>
@@ -2712,7 +2712,7 @@
           <a:p>
             <a:fld id="{01197F44-DB72-474A-9754-31703E05C006}" type="datetimeFigureOut">
               <a:rPr lang="en-US" smtClean="0"/>
-              <a:t>8/14/19</a:t>
+              <a:t>10/11/19</a:t>
             </a:fld>
             <a:endParaRPr lang="en-US"/>
           </a:p>
@@ -2965,7 +2965,7 @@
           <a:p>
             <a:fld id="{01197F44-DB72-474A-9754-31703E05C006}" type="datetimeFigureOut">
               <a:rPr lang="en-US" smtClean="0"/>
-              <a:t>8/14/19</a:t>
+              <a:t>10/11/19</a:t>
             </a:fld>
             <a:endParaRPr lang="en-US"/>
           </a:p>
@@ -3178,7 +3178,7 @@
           <a:p>
             <a:fld id="{01197F44-DB72-474A-9754-31703E05C006}" type="datetimeFigureOut">
               <a:rPr lang="en-US" smtClean="0"/>
-              <a:t>8/14/19</a:t>
+              <a:t>10/11/19</a:t>
             </a:fld>
             <a:endParaRPr lang="en-US"/>
           </a:p>
@@ -3555,36 +3555,36 @@
       </p:grpSpPr>
       <p:graphicFrame>
         <p:nvGraphicFramePr>
-          <p:cNvPr id="8" name="Table 7"/>
+          <p:cNvPr id="6" name="Table 5"/>
           <p:cNvGraphicFramePr>
             <a:graphicFrameLocks noGrp="1"/>
           </p:cNvGraphicFramePr>
           <p:nvPr>
             <p:extLst>
               <p:ext uri="{D42A27DB-BD31-4B8C-83A1-F6EECF244321}">
-                <p14:modId xmlns:p14="http://schemas.microsoft.com/office/powerpoint/2010/main" val="1601751470"/>
+                <p14:modId xmlns:p14="http://schemas.microsoft.com/office/powerpoint/2010/main" val="1803214743"/>
               </p:ext>
             </p:extLst>
           </p:nvPr>
         </p:nvGraphicFramePr>
         <p:xfrm>
-          <a:off x="50802" y="83608"/>
-          <a:ext cx="7200232" cy="3017833"/>
+          <a:off x="84665" y="67734"/>
+          <a:ext cx="7154333" cy="3048000"/>
         </p:xfrm>
         <a:graphic>
           <a:graphicData uri="http://schemas.openxmlformats.org/drawingml/2006/table">
             <a:tbl>
               <a:tblPr/>
               <a:tblGrid>
-                <a:gridCol w="610986"/>
-                <a:gridCol w="1513366"/>
-                <a:gridCol w="1015176"/>
-                <a:gridCol w="1015176"/>
-                <a:gridCol w="1015176"/>
-                <a:gridCol w="1015176"/>
-                <a:gridCol w="1015176"/>
+                <a:gridCol w="607091"/>
+                <a:gridCol w="1503717"/>
+                <a:gridCol w="1008705"/>
+                <a:gridCol w="1008705"/>
+                <a:gridCol w="1008705"/>
+                <a:gridCol w="1008705"/>
+                <a:gridCol w="1008705"/>
               </a:tblGrid>
-              <a:tr h="613585">
+              <a:tr h="594636">
                 <a:tc>
                   <a:txBody>
                     <a:bodyPr/>
@@ -3603,7 +3603,7 @@
                       </a:r>
                     </a:p>
                   </a:txBody>
-                  <a:tcPr marL="12522" marR="12522" marT="12522" marB="0" anchor="ctr">
+                  <a:tcPr marL="8767" marR="8767" marT="8767" marB="0" anchor="ctr">
                     <a:lnL w="6350" cap="flat" cmpd="sng" algn="ctr">
                       <a:solidFill>
                         <a:srgbClr val="000000"/>
@@ -3660,7 +3660,7 @@
                       </a:r>
                     </a:p>
                   </a:txBody>
-                  <a:tcPr marL="12522" marR="12522" marT="12522" marB="0" anchor="ctr">
+                  <a:tcPr marL="8767" marR="8767" marT="8767" marB="0" anchor="ctr">
                     <a:lnL w="6350" cap="flat" cmpd="sng" algn="ctr">
                       <a:solidFill>
                         <a:srgbClr val="000000"/>
@@ -3717,7 +3717,7 @@
                       </a:r>
                     </a:p>
                   </a:txBody>
-                  <a:tcPr marL="12522" marR="12522" marT="12522" marB="0" anchor="ctr">
+                  <a:tcPr marL="8767" marR="8767" marT="8767" marB="0" anchor="ctr">
                     <a:lnL w="6350" cap="flat" cmpd="sng" algn="ctr">
                       <a:solidFill>
                         <a:srgbClr val="000000"/>
@@ -3774,7 +3774,7 @@
                       </a:r>
                     </a:p>
                   </a:txBody>
-                  <a:tcPr marL="12522" marR="12522" marT="12522" marB="0" anchor="ctr">
+                  <a:tcPr marL="8767" marR="8767" marT="8767" marB="0" anchor="ctr">
                     <a:lnL w="6350" cap="flat" cmpd="sng" algn="ctr">
                       <a:solidFill>
                         <a:srgbClr val="000000"/>
@@ -3831,7 +3831,7 @@
                       </a:r>
                     </a:p>
                   </a:txBody>
-                  <a:tcPr marL="12522" marR="12522" marT="12522" marB="0" anchor="ctr">
+                  <a:tcPr marL="8767" marR="8767" marT="8767" marB="0" anchor="ctr">
                     <a:lnL w="6350" cap="flat" cmpd="sng" algn="ctr">
                       <a:solidFill>
                         <a:srgbClr val="000000"/>
@@ -3888,7 +3888,7 @@
                       </a:r>
                     </a:p>
                   </a:txBody>
-                  <a:tcPr marL="12522" marR="12522" marT="12522" marB="0" anchor="ctr">
+                  <a:tcPr marL="8767" marR="8767" marT="8767" marB="0" anchor="ctr">
                     <a:lnL w="6350" cap="flat" cmpd="sng" algn="ctr">
                       <a:solidFill>
                         <a:srgbClr val="000000"/>
@@ -3945,7 +3945,7 @@
                       </a:r>
                     </a:p>
                   </a:txBody>
-                  <a:tcPr marL="12522" marR="12522" marT="12522" marB="0" anchor="ctr">
+                  <a:tcPr marL="8767" marR="8767" marT="8767" marB="0" anchor="ctr">
                     <a:lnL w="6350" cap="flat" cmpd="sng" algn="ctr">
                       <a:solidFill>
                         <a:srgbClr val="000000"/>
@@ -3985,7 +3985,7 @@
                   </a:tcPr>
                 </a:tc>
               </a:tr>
-              <a:tr h="200354">
+              <a:tr h="204447">
                 <a:tc rowSpan="3">
                   <a:txBody>
                     <a:bodyPr/>
@@ -4004,7 +4004,7 @@
                       </a:r>
                     </a:p>
                   </a:txBody>
-                  <a:tcPr marL="12522" marR="12522" marT="12522" marB="0" anchor="ctr">
+                  <a:tcPr marL="8767" marR="8767" marT="8767" marB="0" anchor="ctr">
                     <a:lnL w="6350" cap="flat" cmpd="sng" algn="ctr">
                       <a:solidFill>
                         <a:srgbClr val="000000"/>
@@ -4061,7 +4061,7 @@
                       </a:r>
                     </a:p>
                   </a:txBody>
-                  <a:tcPr marL="12522" marR="12522" marT="12522" marB="0" anchor="ctr">
+                  <a:tcPr marL="8767" marR="8767" marT="8767" marB="0" anchor="ctr">
                     <a:lnL w="6350" cap="flat" cmpd="sng" algn="ctr">
                       <a:solidFill>
                         <a:srgbClr val="000000"/>
@@ -4118,7 +4118,7 @@
                       </a:r>
                     </a:p>
                   </a:txBody>
-                  <a:tcPr marL="12522" marR="12522" marT="12522" marB="0" anchor="ctr">
+                  <a:tcPr marL="8767" marR="8767" marT="8767" marB="0" anchor="ctr">
                     <a:lnL w="6350" cap="flat" cmpd="sng" algn="ctr">
                       <a:solidFill>
                         <a:srgbClr val="000000"/>
@@ -4175,7 +4175,7 @@
                       </a:r>
                     </a:p>
                   </a:txBody>
-                  <a:tcPr marL="12522" marR="12522" marT="12522" marB="0" anchor="ctr">
+                  <a:tcPr marL="8767" marR="8767" marT="8767" marB="0" anchor="ctr">
                     <a:lnL w="6350" cap="flat" cmpd="sng" algn="ctr">
                       <a:solidFill>
                         <a:srgbClr val="000000"/>
@@ -4228,11 +4228,11 @@
                           <a:effectLst/>
                           <a:latin typeface="Calibri" charset="0"/>
                         </a:rPr>
-                        <a:t>153</a:t>
+                        <a:t>150</a:t>
                       </a:r>
                     </a:p>
                   </a:txBody>
-                  <a:tcPr marL="12522" marR="12522" marT="12522" marB="0" anchor="ctr">
+                  <a:tcPr marL="8767" marR="8767" marT="8767" marB="0" anchor="ctr">
                     <a:lnL w="6350" cap="flat" cmpd="sng" algn="ctr">
                       <a:solidFill>
                         <a:srgbClr val="000000"/>
@@ -4289,7 +4289,7 @@
                       </a:r>
                     </a:p>
                   </a:txBody>
-                  <a:tcPr marL="12522" marR="12522" marT="12522" marB="0" anchor="ctr">
+                  <a:tcPr marL="8767" marR="8767" marT="8767" marB="0" anchor="ctr">
                     <a:lnL w="6350" cap="flat" cmpd="sng" algn="ctr">
                       <a:solidFill>
                         <a:srgbClr val="000000"/>
@@ -4346,7 +4346,7 @@
                       </a:r>
                     </a:p>
                   </a:txBody>
-                  <a:tcPr marL="12522" marR="12522" marT="12522" marB="0" anchor="ctr">
+                  <a:tcPr marL="8767" marR="8767" marT="8767" marB="0" anchor="ctr">
                     <a:lnL w="6350" cap="flat" cmpd="sng" algn="ctr">
                       <a:solidFill>
                         <a:srgbClr val="000000"/>
@@ -4386,7 +4386,7 @@
                   </a:tcPr>
                 </a:tc>
               </a:tr>
-              <a:tr h="200354">
+              <a:tr h="204447">
                 <a:tc vMerge="1">
                   <a:txBody>
                     <a:bodyPr/>
@@ -4415,7 +4415,7 @@
                       </a:r>
                     </a:p>
                   </a:txBody>
-                  <a:tcPr marL="12522" marR="12522" marT="12522" marB="0" anchor="ctr">
+                  <a:tcPr marL="8767" marR="8767" marT="8767" marB="0" anchor="ctr">
                     <a:lnL w="6350" cap="flat" cmpd="sng" algn="ctr">
                       <a:solidFill>
                         <a:srgbClr val="000000"/>
@@ -4472,7 +4472,7 @@
                       </a:r>
                     </a:p>
                   </a:txBody>
-                  <a:tcPr marL="12522" marR="12522" marT="12522" marB="0" anchor="ctr">
+                  <a:tcPr marL="8767" marR="8767" marT="8767" marB="0" anchor="ctr">
                     <a:lnL w="6350" cap="flat" cmpd="sng" algn="ctr">
                       <a:solidFill>
                         <a:srgbClr val="000000"/>
@@ -4529,7 +4529,7 @@
                       </a:r>
                     </a:p>
                   </a:txBody>
-                  <a:tcPr marL="12522" marR="12522" marT="12522" marB="0" anchor="ctr">
+                  <a:tcPr marL="8767" marR="8767" marT="8767" marB="0" anchor="ctr">
                     <a:lnL w="6350" cap="flat" cmpd="sng" algn="ctr">
                       <a:solidFill>
                         <a:srgbClr val="000000"/>
@@ -4586,7 +4586,7 @@
                       </a:r>
                     </a:p>
                   </a:txBody>
-                  <a:tcPr marL="12522" marR="12522" marT="12522" marB="0" anchor="ctr">
+                  <a:tcPr marL="8767" marR="8767" marT="8767" marB="0" anchor="ctr">
                     <a:lnL w="6350" cap="flat" cmpd="sng" algn="ctr">
                       <a:solidFill>
                         <a:srgbClr val="000000"/>
@@ -4643,7 +4643,7 @@
                       </a:r>
                     </a:p>
                   </a:txBody>
-                  <a:tcPr marL="12522" marR="12522" marT="12522" marB="0" anchor="ctr">
+                  <a:tcPr marL="8767" marR="8767" marT="8767" marB="0" anchor="ctr">
                     <a:lnL w="6350" cap="flat" cmpd="sng" algn="ctr">
                       <a:solidFill>
                         <a:srgbClr val="000000"/>
@@ -4700,7 +4700,7 @@
                       </a:r>
                     </a:p>
                   </a:txBody>
-                  <a:tcPr marL="12522" marR="12522" marT="12522" marB="0" anchor="ctr">
+                  <a:tcPr marL="8767" marR="8767" marT="8767" marB="0" anchor="ctr">
                     <a:lnL w="6350" cap="flat" cmpd="sng" algn="ctr">
                       <a:solidFill>
                         <a:srgbClr val="000000"/>
@@ -4740,7 +4740,7 @@
                   </a:tcPr>
                 </a:tc>
               </a:tr>
-              <a:tr h="200354">
+              <a:tr h="204447">
                 <a:tc vMerge="1">
                   <a:txBody>
                     <a:bodyPr/>
@@ -4769,7 +4769,7 @@
                       </a:r>
                     </a:p>
                   </a:txBody>
-                  <a:tcPr marL="12522" marR="12522" marT="12522" marB="0" anchor="ctr">
+                  <a:tcPr marL="8767" marR="8767" marT="8767" marB="0" anchor="ctr">
                     <a:lnL w="6350" cap="flat" cmpd="sng" algn="ctr">
                       <a:solidFill>
                         <a:srgbClr val="000000"/>
@@ -4826,7 +4826,7 @@
                       </a:r>
                     </a:p>
                   </a:txBody>
-                  <a:tcPr marL="12522" marR="12522" marT="12522" marB="0" anchor="ctr">
+                  <a:tcPr marL="8767" marR="8767" marT="8767" marB="0" anchor="ctr">
                     <a:lnL w="6350" cap="flat" cmpd="sng" algn="ctr">
                       <a:solidFill>
                         <a:srgbClr val="000000"/>
@@ -4883,7 +4883,7 @@
                       </a:r>
                     </a:p>
                   </a:txBody>
-                  <a:tcPr marL="12522" marR="12522" marT="12522" marB="0" anchor="ctr">
+                  <a:tcPr marL="8767" marR="8767" marT="8767" marB="0" anchor="ctr">
                     <a:lnL w="6350" cap="flat" cmpd="sng" algn="ctr">
                       <a:solidFill>
                         <a:srgbClr val="000000"/>
@@ -4940,7 +4940,7 @@
                       </a:r>
                     </a:p>
                   </a:txBody>
-                  <a:tcPr marL="12522" marR="12522" marT="12522" marB="0" anchor="ctr">
+                  <a:tcPr marL="8767" marR="8767" marT="8767" marB="0" anchor="ctr">
                     <a:lnL w="6350" cap="flat" cmpd="sng" algn="ctr">
                       <a:solidFill>
                         <a:srgbClr val="000000"/>
@@ -4997,7 +4997,7 @@
                       </a:r>
                     </a:p>
                   </a:txBody>
-                  <a:tcPr marL="12522" marR="12522" marT="12522" marB="0" anchor="ctr">
+                  <a:tcPr marL="8767" marR="8767" marT="8767" marB="0" anchor="ctr">
                     <a:lnL w="6350" cap="flat" cmpd="sng" algn="ctr">
                       <a:solidFill>
                         <a:srgbClr val="000000"/>
@@ -5054,7 +5054,7 @@
                       </a:r>
                     </a:p>
                   </a:txBody>
-                  <a:tcPr marL="12522" marR="12522" marT="12522" marB="0" anchor="ctr">
+                  <a:tcPr marL="8767" marR="8767" marT="8767" marB="0" anchor="ctr">
                     <a:lnL w="6350" cap="flat" cmpd="sng" algn="ctr">
                       <a:solidFill>
                         <a:srgbClr val="000000"/>
@@ -5094,7 +5094,7 @@
                   </a:tcPr>
                 </a:tc>
               </a:tr>
-              <a:tr h="200354">
+              <a:tr h="204447">
                 <a:tc rowSpan="8">
                   <a:txBody>
                     <a:bodyPr/>
@@ -5113,7 +5113,7 @@
                       </a:r>
                     </a:p>
                   </a:txBody>
-                  <a:tcPr marL="12522" marR="12522" marT="12522" marB="0" anchor="ctr">
+                  <a:tcPr marL="8767" marR="8767" marT="8767" marB="0" anchor="ctr">
                     <a:lnL w="6350" cap="flat" cmpd="sng" algn="ctr">
                       <a:solidFill>
                         <a:srgbClr val="000000"/>
@@ -5170,7 +5170,7 @@
                       </a:r>
                     </a:p>
                   </a:txBody>
-                  <a:tcPr marL="12522" marR="12522" marT="12522" marB="0" anchor="ctr">
+                  <a:tcPr marL="8767" marR="8767" marT="8767" marB="0" anchor="ctr">
                     <a:lnL w="6350" cap="flat" cmpd="sng" algn="ctr">
                       <a:solidFill>
                         <a:srgbClr val="000000"/>
@@ -5227,7 +5227,7 @@
                       </a:r>
                     </a:p>
                   </a:txBody>
-                  <a:tcPr marL="12522" marR="12522" marT="12522" marB="0" anchor="ctr">
+                  <a:tcPr marL="8767" marR="8767" marT="8767" marB="0" anchor="ctr">
                     <a:lnL w="6350" cap="flat" cmpd="sng" algn="ctr">
                       <a:solidFill>
                         <a:srgbClr val="000000"/>
@@ -5284,7 +5284,7 @@
                       </a:r>
                     </a:p>
                   </a:txBody>
-                  <a:tcPr marL="12522" marR="12522" marT="12522" marB="0" anchor="ctr">
+                  <a:tcPr marL="8767" marR="8767" marT="8767" marB="0" anchor="ctr">
                     <a:lnL w="6350" cap="flat" cmpd="sng" algn="ctr">
                       <a:solidFill>
                         <a:srgbClr val="000000"/>
@@ -5330,18 +5330,18 @@
                     <a:p>
                       <a:pPr algn="ctr" fontAlgn="ctr"/>
                       <a:r>
-                        <a:rPr lang="is-IS" sz="1200" b="0" i="0" u="none" strike="noStrike">
+                        <a:rPr lang="fi-FI" sz="1200" b="0" i="0" u="none" strike="noStrike">
                           <a:solidFill>
                             <a:srgbClr val="000000"/>
                           </a:solidFill>
                           <a:effectLst/>
                           <a:latin typeface="Calibri" charset="0"/>
                         </a:rPr>
-                        <a:t>504</a:t>
+                        <a:t>502</a:t>
                       </a:r>
                     </a:p>
                   </a:txBody>
-                  <a:tcPr marL="12522" marR="12522" marT="12522" marB="0" anchor="ctr">
+                  <a:tcPr marL="8767" marR="8767" marT="8767" marB="0" anchor="ctr">
                     <a:lnL w="6350" cap="flat" cmpd="sng" algn="ctr">
                       <a:solidFill>
                         <a:srgbClr val="000000"/>
@@ -5398,7 +5398,7 @@
                       </a:r>
                     </a:p>
                   </a:txBody>
-                  <a:tcPr marL="12522" marR="12522" marT="12522" marB="0" anchor="ctr">
+                  <a:tcPr marL="8767" marR="8767" marT="8767" marB="0" anchor="ctr">
                     <a:lnL w="6350" cap="flat" cmpd="sng" algn="ctr">
                       <a:solidFill>
                         <a:srgbClr val="000000"/>
@@ -5455,7 +5455,7 @@
                       </a:r>
                     </a:p>
                   </a:txBody>
-                  <a:tcPr marL="12522" marR="12522" marT="12522" marB="0" anchor="ctr">
+                  <a:tcPr marL="8767" marR="8767" marT="8767" marB="0" anchor="ctr">
                     <a:lnL w="6350" cap="flat" cmpd="sng" algn="ctr">
                       <a:solidFill>
                         <a:srgbClr val="000000"/>
@@ -5495,7 +5495,7 @@
                   </a:tcPr>
                 </a:tc>
               </a:tr>
-              <a:tr h="200354">
+              <a:tr h="204447">
                 <a:tc vMerge="1">
                   <a:txBody>
                     <a:bodyPr/>
@@ -5524,7 +5524,7 @@
                       </a:r>
                     </a:p>
                   </a:txBody>
-                  <a:tcPr marL="12522" marR="12522" marT="12522" marB="0" anchor="ctr">
+                  <a:tcPr marL="8767" marR="8767" marT="8767" marB="0" anchor="ctr">
                     <a:lnL w="6350" cap="flat" cmpd="sng" algn="ctr">
                       <a:solidFill>
                         <a:srgbClr val="000000"/>
@@ -5581,7 +5581,7 @@
                       </a:r>
                     </a:p>
                   </a:txBody>
-                  <a:tcPr marL="12522" marR="12522" marT="12522" marB="0" anchor="ctr">
+                  <a:tcPr marL="8767" marR="8767" marT="8767" marB="0" anchor="ctr">
                     <a:lnL w="6350" cap="flat" cmpd="sng" algn="ctr">
                       <a:solidFill>
                         <a:srgbClr val="000000"/>
@@ -5627,18 +5627,18 @@
                     <a:p>
                       <a:pPr algn="ctr" fontAlgn="ctr"/>
                       <a:r>
-                        <a:rPr lang="uk-UA" sz="1200" b="0" i="0" u="none" strike="noStrike">
+                        <a:rPr lang="en-US" sz="1200" b="0" i="0" u="none" strike="noStrike">
                           <a:solidFill>
                             <a:srgbClr val="000000"/>
                           </a:solidFill>
                           <a:effectLst/>
                           <a:latin typeface="Calibri" charset="0"/>
                         </a:rPr>
-                        <a:t>539</a:t>
+                        <a:t>540</a:t>
                       </a:r>
                     </a:p>
                   </a:txBody>
-                  <a:tcPr marL="12522" marR="12522" marT="12522" marB="0" anchor="ctr">
+                  <a:tcPr marL="8767" marR="8767" marT="8767" marB="0" anchor="ctr">
                     <a:lnL w="6350" cap="flat" cmpd="sng" algn="ctr">
                       <a:solidFill>
                         <a:srgbClr val="000000"/>
@@ -5684,18 +5684,18 @@
                     <a:p>
                       <a:pPr algn="ctr" fontAlgn="ctr"/>
                       <a:r>
-                        <a:rPr lang="is-IS" sz="1200" b="0" i="0" u="none" strike="noStrike">
+                        <a:rPr lang="cs-CZ" sz="1200" b="0" i="0" u="none" strike="noStrike">
                           <a:solidFill>
                             <a:srgbClr val="000000"/>
                           </a:solidFill>
                           <a:effectLst/>
                           <a:latin typeface="Calibri" charset="0"/>
                         </a:rPr>
-                        <a:t>778</a:t>
+                        <a:t>583</a:t>
                       </a:r>
                     </a:p>
                   </a:txBody>
-                  <a:tcPr marL="12522" marR="12522" marT="12522" marB="0" anchor="ctr">
+                  <a:tcPr marL="8767" marR="8767" marT="8767" marB="0" anchor="ctr">
                     <a:lnL w="6350" cap="flat" cmpd="sng" algn="ctr">
                       <a:solidFill>
                         <a:srgbClr val="000000"/>
@@ -5741,18 +5741,18 @@
                     <a:p>
                       <a:pPr algn="ctr" fontAlgn="ctr"/>
                       <a:r>
-                        <a:rPr lang="is-IS" sz="1200" b="0" i="0" u="none" strike="noStrike">
+                        <a:rPr lang="en-US" sz="1200" b="0" i="0" u="none" strike="noStrike">
                           <a:solidFill>
                             <a:srgbClr val="000000"/>
                           </a:solidFill>
                           <a:effectLst/>
                           <a:latin typeface="Calibri" charset="0"/>
                         </a:rPr>
-                        <a:t>37</a:t>
+                        <a:t>38</a:t>
                       </a:r>
                     </a:p>
                   </a:txBody>
-                  <a:tcPr marL="12522" marR="12522" marT="12522" marB="0" anchor="ctr">
+                  <a:tcPr marL="8767" marR="8767" marT="8767" marB="0" anchor="ctr">
                     <a:lnL w="6350" cap="flat" cmpd="sng" algn="ctr">
                       <a:solidFill>
                         <a:srgbClr val="000000"/>
@@ -5798,18 +5798,18 @@
                     <a:p>
                       <a:pPr algn="ctr" fontAlgn="ctr"/>
                       <a:r>
-                        <a:rPr lang="is-IS" sz="1200" b="0" i="0" u="none" strike="noStrike">
+                        <a:rPr lang="en-US" sz="1200" b="0" i="0" u="none" strike="noStrike">
                           <a:solidFill>
                             <a:srgbClr val="000000"/>
                           </a:solidFill>
                           <a:effectLst/>
                           <a:latin typeface="Calibri" charset="0"/>
                         </a:rPr>
-                        <a:t>37</a:t>
+                        <a:t>38</a:t>
                       </a:r>
                     </a:p>
                   </a:txBody>
-                  <a:tcPr marL="12522" marR="12522" marT="12522" marB="0" anchor="ctr">
+                  <a:tcPr marL="8767" marR="8767" marT="8767" marB="0" anchor="ctr">
                     <a:lnL w="6350" cap="flat" cmpd="sng" algn="ctr">
                       <a:solidFill>
                         <a:srgbClr val="000000"/>
@@ -5849,7 +5849,7 @@
                   </a:tcPr>
                 </a:tc>
               </a:tr>
-              <a:tr h="200354">
+              <a:tr h="204447">
                 <a:tc vMerge="1">
                   <a:txBody>
                     <a:bodyPr/>
@@ -5878,7 +5878,7 @@
                       </a:r>
                     </a:p>
                   </a:txBody>
-                  <a:tcPr marL="12522" marR="12522" marT="12522" marB="0" anchor="ctr">
+                  <a:tcPr marL="8767" marR="8767" marT="8767" marB="0" anchor="ctr">
                     <a:lnL w="6350" cap="flat" cmpd="sng" algn="ctr">
                       <a:solidFill>
                         <a:srgbClr val="000000"/>
@@ -5935,7 +5935,7 @@
                       </a:r>
                     </a:p>
                   </a:txBody>
-                  <a:tcPr marL="12522" marR="12522" marT="12522" marB="0" anchor="ctr">
+                  <a:tcPr marL="8767" marR="8767" marT="8767" marB="0" anchor="ctr">
                     <a:lnL w="6350" cap="flat" cmpd="sng" algn="ctr">
                       <a:solidFill>
                         <a:srgbClr val="000000"/>
@@ -5992,7 +5992,7 @@
                       </a:r>
                     </a:p>
                   </a:txBody>
-                  <a:tcPr marL="12522" marR="12522" marT="12522" marB="0" anchor="ctr">
+                  <a:tcPr marL="8767" marR="8767" marT="8767" marB="0" anchor="ctr">
                     <a:lnL w="6350" cap="flat" cmpd="sng" algn="ctr">
                       <a:solidFill>
                         <a:srgbClr val="000000"/>
@@ -6038,18 +6038,18 @@
                     <a:p>
                       <a:pPr algn="ctr" fontAlgn="ctr"/>
                       <a:r>
-                        <a:rPr lang="is-IS" sz="1200" b="0" i="0" u="none" strike="noStrike">
+                        <a:rPr lang="cs-CZ" sz="1200" b="0" i="0" u="none" strike="noStrike">
                           <a:solidFill>
                             <a:srgbClr val="000000"/>
                           </a:solidFill>
                           <a:effectLst/>
                           <a:latin typeface="Calibri" charset="0"/>
                         </a:rPr>
-                        <a:t>22</a:t>
+                        <a:t>21</a:t>
                       </a:r>
                     </a:p>
                   </a:txBody>
-                  <a:tcPr marL="12522" marR="12522" marT="12522" marB="0" anchor="ctr">
+                  <a:tcPr marL="8767" marR="8767" marT="8767" marB="0" anchor="ctr">
                     <a:lnL w="6350" cap="flat" cmpd="sng" algn="ctr">
                       <a:solidFill>
                         <a:srgbClr val="000000"/>
@@ -6106,7 +6106,7 @@
                       </a:r>
                     </a:p>
                   </a:txBody>
-                  <a:tcPr marL="12522" marR="12522" marT="12522" marB="0" anchor="ctr">
+                  <a:tcPr marL="8767" marR="8767" marT="8767" marB="0" anchor="ctr">
                     <a:lnL w="6350" cap="flat" cmpd="sng" algn="ctr">
                       <a:solidFill>
                         <a:srgbClr val="000000"/>
@@ -6163,7 +6163,7 @@
                       </a:r>
                     </a:p>
                   </a:txBody>
-                  <a:tcPr marL="12522" marR="12522" marT="12522" marB="0" anchor="ctr">
+                  <a:tcPr marL="8767" marR="8767" marT="8767" marB="0" anchor="ctr">
                     <a:lnL w="6350" cap="flat" cmpd="sng" algn="ctr">
                       <a:solidFill>
                         <a:srgbClr val="000000"/>
@@ -6203,7 +6203,7 @@
                   </a:tcPr>
                 </a:tc>
               </a:tr>
-              <a:tr h="200354">
+              <a:tr h="204447">
                 <a:tc vMerge="1">
                   <a:txBody>
                     <a:bodyPr/>
@@ -6232,7 +6232,7 @@
                       </a:r>
                     </a:p>
                   </a:txBody>
-                  <a:tcPr marL="12522" marR="12522" marT="12522" marB="0" anchor="ctr">
+                  <a:tcPr marL="8767" marR="8767" marT="8767" marB="0" anchor="ctr">
                     <a:lnL w="6350" cap="flat" cmpd="sng" algn="ctr">
                       <a:solidFill>
                         <a:srgbClr val="000000"/>
@@ -6289,7 +6289,7 @@
                       </a:r>
                     </a:p>
                   </a:txBody>
-                  <a:tcPr marL="12522" marR="12522" marT="12522" marB="0" anchor="ctr">
+                  <a:tcPr marL="8767" marR="8767" marT="8767" marB="0" anchor="ctr">
                     <a:lnL w="6350" cap="flat" cmpd="sng" algn="ctr">
                       <a:solidFill>
                         <a:srgbClr val="000000"/>
@@ -6346,7 +6346,7 @@
                       </a:r>
                     </a:p>
                   </a:txBody>
-                  <a:tcPr marL="12522" marR="12522" marT="12522" marB="0" anchor="ctr">
+                  <a:tcPr marL="8767" marR="8767" marT="8767" marB="0" anchor="ctr">
                     <a:lnL w="6350" cap="flat" cmpd="sng" algn="ctr">
                       <a:solidFill>
                         <a:srgbClr val="000000"/>
@@ -6403,7 +6403,7 @@
                       </a:r>
                     </a:p>
                   </a:txBody>
-                  <a:tcPr marL="12522" marR="12522" marT="12522" marB="0" anchor="ctr">
+                  <a:tcPr marL="8767" marR="8767" marT="8767" marB="0" anchor="ctr">
                     <a:lnL w="6350" cap="flat" cmpd="sng" algn="ctr">
                       <a:solidFill>
                         <a:srgbClr val="000000"/>
@@ -6460,7 +6460,7 @@
                       </a:r>
                     </a:p>
                   </a:txBody>
-                  <a:tcPr marL="12522" marR="12522" marT="12522" marB="0" anchor="ctr">
+                  <a:tcPr marL="8767" marR="8767" marT="8767" marB="0" anchor="ctr">
                     <a:lnL w="6350" cap="flat" cmpd="sng" algn="ctr">
                       <a:solidFill>
                         <a:srgbClr val="000000"/>
@@ -6517,7 +6517,7 @@
                       </a:r>
                     </a:p>
                   </a:txBody>
-                  <a:tcPr marL="12522" marR="12522" marT="12522" marB="0" anchor="ctr">
+                  <a:tcPr marL="8767" marR="8767" marT="8767" marB="0" anchor="ctr">
                     <a:lnL w="6350" cap="flat" cmpd="sng" algn="ctr">
                       <a:solidFill>
                         <a:srgbClr val="000000"/>
@@ -6557,7 +6557,7 @@
                   </a:tcPr>
                 </a:tc>
               </a:tr>
-              <a:tr h="200354">
+              <a:tr h="204447">
                 <a:tc vMerge="1">
                   <a:txBody>
                     <a:bodyPr/>
@@ -6586,7 +6586,7 @@
                       </a:r>
                     </a:p>
                   </a:txBody>
-                  <a:tcPr marL="12522" marR="12522" marT="12522" marB="0" anchor="ctr">
+                  <a:tcPr marL="8767" marR="8767" marT="8767" marB="0" anchor="ctr">
                     <a:lnL w="6350" cap="flat" cmpd="sng" algn="ctr">
                       <a:solidFill>
                         <a:srgbClr val="000000"/>
@@ -6643,7 +6643,7 @@
                       </a:r>
                     </a:p>
                   </a:txBody>
-                  <a:tcPr marL="12522" marR="12522" marT="12522" marB="0" anchor="ctr">
+                  <a:tcPr marL="8767" marR="8767" marT="8767" marB="0" anchor="ctr">
                     <a:lnL w="6350" cap="flat" cmpd="sng" algn="ctr">
                       <a:solidFill>
                         <a:srgbClr val="000000"/>
@@ -6696,11 +6696,11 @@
                           <a:effectLst/>
                           <a:latin typeface="Calibri" charset="0"/>
                         </a:rPr>
-                        <a:t>56</a:t>
+                        <a:t>55</a:t>
                       </a:r>
                     </a:p>
                   </a:txBody>
-                  <a:tcPr marL="12522" marR="12522" marT="12522" marB="0" anchor="ctr">
+                  <a:tcPr marL="8767" marR="8767" marT="8767" marB="0" anchor="ctr">
                     <a:lnL w="6350" cap="flat" cmpd="sng" algn="ctr">
                       <a:solidFill>
                         <a:srgbClr val="000000"/>
@@ -6746,18 +6746,18 @@
                     <a:p>
                       <a:pPr algn="ctr" fontAlgn="ctr"/>
                       <a:r>
-                        <a:rPr lang="is-IS" sz="1200" b="0" i="0" u="none" strike="noStrike">
+                        <a:rPr lang="en-US" sz="1200" b="0" i="0" u="none" strike="noStrike">
                           <a:solidFill>
                             <a:srgbClr val="000000"/>
                           </a:solidFill>
                           <a:effectLst/>
                           <a:latin typeface="Calibri" charset="0"/>
                         </a:rPr>
-                        <a:t>68</a:t>
+                        <a:t>61</a:t>
                       </a:r>
                     </a:p>
                   </a:txBody>
-                  <a:tcPr marL="12522" marR="12522" marT="12522" marB="0" anchor="ctr">
+                  <a:tcPr marL="8767" marR="8767" marT="8767" marB="0" anchor="ctr">
                     <a:lnL w="6350" cap="flat" cmpd="sng" algn="ctr">
                       <a:solidFill>
                         <a:srgbClr val="000000"/>
@@ -6814,7 +6814,7 @@
                       </a:r>
                     </a:p>
                   </a:txBody>
-                  <a:tcPr marL="12522" marR="12522" marT="12522" marB="0" anchor="ctr">
+                  <a:tcPr marL="8767" marR="8767" marT="8767" marB="0" anchor="ctr">
                     <a:lnL w="6350" cap="flat" cmpd="sng" algn="ctr">
                       <a:solidFill>
                         <a:srgbClr val="000000"/>
@@ -6871,7 +6871,7 @@
                       </a:r>
                     </a:p>
                   </a:txBody>
-                  <a:tcPr marL="12522" marR="12522" marT="12522" marB="0" anchor="ctr">
+                  <a:tcPr marL="8767" marR="8767" marT="8767" marB="0" anchor="ctr">
                     <a:lnL w="6350" cap="flat" cmpd="sng" algn="ctr">
                       <a:solidFill>
                         <a:srgbClr val="000000"/>
@@ -6911,7 +6911,7 @@
                   </a:tcPr>
                 </a:tc>
               </a:tr>
-              <a:tr h="200354">
+              <a:tr h="204447">
                 <a:tc vMerge="1">
                   <a:txBody>
                     <a:bodyPr/>
@@ -6940,7 +6940,7 @@
                       </a:r>
                     </a:p>
                   </a:txBody>
-                  <a:tcPr marL="12522" marR="12522" marT="12522" marB="0" anchor="ctr">
+                  <a:tcPr marL="8767" marR="8767" marT="8767" marB="0" anchor="ctr">
                     <a:lnL w="6350" cap="flat" cmpd="sng" algn="ctr">
                       <a:solidFill>
                         <a:srgbClr val="000000"/>
@@ -6997,7 +6997,7 @@
                       </a:r>
                     </a:p>
                   </a:txBody>
-                  <a:tcPr marL="12522" marR="12522" marT="12522" marB="0" anchor="ctr">
+                  <a:tcPr marL="8767" marR="8767" marT="8767" marB="0" anchor="ctr">
                     <a:lnL w="6350" cap="flat" cmpd="sng" algn="ctr">
                       <a:solidFill>
                         <a:srgbClr val="000000"/>
@@ -7054,7 +7054,7 @@
                       </a:r>
                     </a:p>
                   </a:txBody>
-                  <a:tcPr marL="12522" marR="12522" marT="12522" marB="0" anchor="ctr">
+                  <a:tcPr marL="8767" marR="8767" marT="8767" marB="0" anchor="ctr">
                     <a:lnL w="6350" cap="flat" cmpd="sng" algn="ctr">
                       <a:solidFill>
                         <a:srgbClr val="000000"/>
@@ -7100,18 +7100,18 @@
                     <a:p>
                       <a:pPr algn="ctr" fontAlgn="ctr"/>
                       <a:r>
-                        <a:rPr lang="en-US" sz="1200" b="0" i="0" u="none" strike="noStrike">
+                        <a:rPr lang="is-IS" sz="1200" b="0" i="0" u="none" strike="noStrike">
                           <a:solidFill>
                             <a:srgbClr val="000000"/>
                           </a:solidFill>
                           <a:effectLst/>
                           <a:latin typeface="Calibri" charset="0"/>
                         </a:rPr>
-                        <a:t>19</a:t>
+                        <a:t>27</a:t>
                       </a:r>
                     </a:p>
                   </a:txBody>
-                  <a:tcPr marL="12522" marR="12522" marT="12522" marB="0" anchor="ctr">
+                  <a:tcPr marL="8767" marR="8767" marT="8767" marB="0" anchor="ctr">
                     <a:lnL w="6350" cap="flat" cmpd="sng" algn="ctr">
                       <a:solidFill>
                         <a:srgbClr val="000000"/>
@@ -7168,7 +7168,7 @@
                       </a:r>
                     </a:p>
                   </a:txBody>
-                  <a:tcPr marL="12522" marR="12522" marT="12522" marB="0" anchor="ctr">
+                  <a:tcPr marL="8767" marR="8767" marT="8767" marB="0" anchor="ctr">
                     <a:lnL w="6350" cap="flat" cmpd="sng" algn="ctr">
                       <a:solidFill>
                         <a:srgbClr val="000000"/>
@@ -7225,7 +7225,7 @@
                       </a:r>
                     </a:p>
                   </a:txBody>
-                  <a:tcPr marL="12522" marR="12522" marT="12522" marB="0" anchor="ctr">
+                  <a:tcPr marL="8767" marR="8767" marT="8767" marB="0" anchor="ctr">
                     <a:lnL w="6350" cap="flat" cmpd="sng" algn="ctr">
                       <a:solidFill>
                         <a:srgbClr val="000000"/>
@@ -7265,7 +7265,7 @@
                   </a:tcPr>
                 </a:tc>
               </a:tr>
-              <a:tr h="200354">
+              <a:tr h="204447">
                 <a:tc vMerge="1">
                   <a:txBody>
                     <a:bodyPr/>
@@ -7294,7 +7294,7 @@
                       </a:r>
                     </a:p>
                   </a:txBody>
-                  <a:tcPr marL="12522" marR="12522" marT="12522" marB="0" anchor="ctr">
+                  <a:tcPr marL="8767" marR="8767" marT="8767" marB="0" anchor="ctr">
                     <a:lnL w="6350" cap="flat" cmpd="sng" algn="ctr">
                       <a:solidFill>
                         <a:srgbClr val="000000"/>
@@ -7351,7 +7351,7 @@
                       </a:r>
                     </a:p>
                   </a:txBody>
-                  <a:tcPr marL="12522" marR="12522" marT="12522" marB="0" anchor="ctr">
+                  <a:tcPr marL="8767" marR="8767" marT="8767" marB="0" anchor="ctr">
                     <a:lnL w="6350" cap="flat" cmpd="sng" algn="ctr">
                       <a:solidFill>
                         <a:srgbClr val="000000"/>
@@ -7408,7 +7408,7 @@
                       </a:r>
                     </a:p>
                   </a:txBody>
-                  <a:tcPr marL="12522" marR="12522" marT="12522" marB="0" anchor="ctr">
+                  <a:tcPr marL="8767" marR="8767" marT="8767" marB="0" anchor="ctr">
                     <a:lnL w="6350" cap="flat" cmpd="sng" algn="ctr">
                       <a:solidFill>
                         <a:srgbClr val="000000"/>
@@ -7465,7 +7465,7 @@
                       </a:r>
                     </a:p>
                   </a:txBody>
-                  <a:tcPr marL="12522" marR="12522" marT="12522" marB="0" anchor="ctr">
+                  <a:tcPr marL="8767" marR="8767" marT="8767" marB="0" anchor="ctr">
                     <a:lnL w="6350" cap="flat" cmpd="sng" algn="ctr">
                       <a:solidFill>
                         <a:srgbClr val="000000"/>
@@ -7522,7 +7522,7 @@
                       </a:r>
                     </a:p>
                   </a:txBody>
-                  <a:tcPr marL="12522" marR="12522" marT="12522" marB="0" anchor="ctr">
+                  <a:tcPr marL="8767" marR="8767" marT="8767" marB="0" anchor="ctr">
                     <a:lnL w="6350" cap="flat" cmpd="sng" algn="ctr">
                       <a:solidFill>
                         <a:srgbClr val="000000"/>
@@ -7579,7 +7579,7 @@
                       </a:r>
                     </a:p>
                   </a:txBody>
-                  <a:tcPr marL="12522" marR="12522" marT="12522" marB="0" anchor="ctr">
+                  <a:tcPr marL="8767" marR="8767" marT="8767" marB="0" anchor="ctr">
                     <a:lnL w="6350" cap="flat" cmpd="sng" algn="ctr">
                       <a:solidFill>
                         <a:srgbClr val="000000"/>
@@ -7619,7 +7619,7 @@
                   </a:tcPr>
                 </a:tc>
               </a:tr>
-              <a:tr h="200354">
+              <a:tr h="204447">
                 <a:tc vMerge="1">
                   <a:txBody>
                     <a:bodyPr/>
@@ -7648,7 +7648,7 @@
                       </a:r>
                     </a:p>
                   </a:txBody>
-                  <a:tcPr marL="12522" marR="12522" marT="12522" marB="0" anchor="ctr">
+                  <a:tcPr marL="8767" marR="8767" marT="8767" marB="0" anchor="ctr">
                     <a:lnL w="6350" cap="flat" cmpd="sng" algn="ctr">
                       <a:solidFill>
                         <a:srgbClr val="000000"/>
@@ -7705,7 +7705,7 @@
                       </a:r>
                     </a:p>
                   </a:txBody>
-                  <a:tcPr marL="12522" marR="12522" marT="12522" marB="0" anchor="ctr">
+                  <a:tcPr marL="8767" marR="8767" marT="8767" marB="0" anchor="ctr">
                     <a:lnL w="6350" cap="flat" cmpd="sng" algn="ctr">
                       <a:solidFill>
                         <a:srgbClr val="000000"/>
@@ -7762,7 +7762,7 @@
                       </a:r>
                     </a:p>
                   </a:txBody>
-                  <a:tcPr marL="12522" marR="12522" marT="12522" marB="0" anchor="ctr">
+                  <a:tcPr marL="8767" marR="8767" marT="8767" marB="0" anchor="ctr">
                     <a:lnL w="6350" cap="flat" cmpd="sng" algn="ctr">
                       <a:solidFill>
                         <a:srgbClr val="000000"/>
@@ -7815,11 +7815,11 @@
                           <a:effectLst/>
                           <a:latin typeface="Calibri" charset="0"/>
                         </a:rPr>
-                        <a:t>56</a:t>
+                        <a:t>46</a:t>
                       </a:r>
                     </a:p>
                   </a:txBody>
-                  <a:tcPr marL="12522" marR="12522" marT="12522" marB="0" anchor="ctr">
+                  <a:tcPr marL="8767" marR="8767" marT="8767" marB="0" anchor="ctr">
                     <a:lnL w="6350" cap="flat" cmpd="sng" algn="ctr">
                       <a:solidFill>
                         <a:srgbClr val="000000"/>
@@ -7876,7 +7876,7 @@
                       </a:r>
                     </a:p>
                   </a:txBody>
-                  <a:tcPr marL="12522" marR="12522" marT="12522" marB="0" anchor="ctr">
+                  <a:tcPr marL="8767" marR="8767" marT="8767" marB="0" anchor="ctr">
                     <a:lnL w="6350" cap="flat" cmpd="sng" algn="ctr">
                       <a:solidFill>
                         <a:srgbClr val="000000"/>
@@ -7933,7 +7933,7 @@
                       </a:r>
                     </a:p>
                   </a:txBody>
-                  <a:tcPr marL="12522" marR="12522" marT="12522" marB="0" anchor="ctr">
+                  <a:tcPr marL="8767" marR="8767" marT="8767" marB="0" anchor="ctr">
                     <a:lnL w="6350" cap="flat" cmpd="sng" algn="ctr">
                       <a:solidFill>
                         <a:srgbClr val="000000"/>
@@ -7973,7 +7973,7 @@
                   </a:tcPr>
                 </a:tc>
               </a:tr>
-              <a:tr h="200354">
+              <a:tr h="204447">
                 <a:tc gridSpan="2">
                   <a:txBody>
                     <a:bodyPr/>
@@ -7992,7 +7992,7 @@
                       </a:r>
                     </a:p>
                   </a:txBody>
-                  <a:tcPr marL="12522" marR="12522" marT="12522" marB="0" anchor="ctr">
+                  <a:tcPr marL="8767" marR="8767" marT="8767" marB="0" anchor="ctr">
                     <a:lnL w="6350" cap="flat" cmpd="sng" algn="ctr">
                       <a:solidFill>
                         <a:srgbClr val="000000"/>
@@ -8059,7 +8059,7 @@
                       </a:r>
                     </a:p>
                   </a:txBody>
-                  <a:tcPr marL="12522" marR="12522" marT="12522" marB="0" anchor="ctr">
+                  <a:tcPr marL="8767" marR="8767" marT="8767" marB="0" anchor="ctr">
                     <a:lnL w="6350" cap="flat" cmpd="sng" algn="ctr">
                       <a:solidFill>
                         <a:srgbClr val="000000"/>
@@ -8116,7 +8116,64 @@
                       </a:r>
                     </a:p>
                   </a:txBody>
-                  <a:tcPr marL="12522" marR="12522" marT="12522" marB="0" anchor="ctr">
+                  <a:tcPr marL="8767" marR="8767" marT="8767" marB="0" anchor="ctr">
+                    <a:lnL w="6350" cap="flat" cmpd="sng" algn="ctr">
+                      <a:solidFill>
+                        <a:srgbClr val="000000"/>
+                      </a:solidFill>
+                      <a:prstDash val="solid"/>
+                      <a:round/>
+                      <a:headEnd type="none" w="med" len="med"/>
+                      <a:tailEnd type="none" w="med" len="med"/>
+                    </a:lnL>
+                    <a:lnR w="6350" cap="flat" cmpd="sng" algn="ctr">
+                      <a:solidFill>
+                        <a:srgbClr val="000000"/>
+                      </a:solidFill>
+                      <a:prstDash val="solid"/>
+                      <a:round/>
+                      <a:headEnd type="none" w="med" len="med"/>
+                      <a:tailEnd type="none" w="med" len="med"/>
+                    </a:lnR>
+                    <a:lnT w="6350" cap="flat" cmpd="sng" algn="ctr">
+                      <a:solidFill>
+                        <a:srgbClr val="000000"/>
+                      </a:solidFill>
+                      <a:prstDash val="solid"/>
+                      <a:round/>
+                      <a:headEnd type="none" w="med" len="med"/>
+                      <a:tailEnd type="none" w="med" len="med"/>
+                    </a:lnT>
+                    <a:lnB w="6350" cap="flat" cmpd="sng" algn="ctr">
+                      <a:solidFill>
+                        <a:srgbClr val="000000"/>
+                      </a:solidFill>
+                      <a:prstDash val="solid"/>
+                      <a:round/>
+                      <a:headEnd type="none" w="med" len="med"/>
+                      <a:tailEnd type="none" w="med" len="med"/>
+                    </a:lnB>
+                  </a:tcPr>
+                </a:tc>
+                <a:tc>
+                  <a:txBody>
+                    <a:bodyPr/>
+                    <a:lstStyle/>
+                    <a:p>
+                      <a:pPr algn="ctr" fontAlgn="ctr"/>
+                      <a:r>
+                        <a:rPr lang="en-US" sz="1200" b="1" i="0" u="none" strike="noStrike">
+                          <a:solidFill>
+                            <a:srgbClr val="000000"/>
+                          </a:solidFill>
+                          <a:effectLst/>
+                          <a:latin typeface="Calibri" charset="0"/>
+                        </a:rPr>
+                        <a:t>1475</a:t>
+                      </a:r>
+                    </a:p>
+                  </a:txBody>
+                  <a:tcPr marL="8767" marR="8767" marT="8767" marB="0" anchor="ctr">
                     <a:lnL w="6350" cap="flat" cmpd="sng" algn="ctr">
                       <a:solidFill>
                         <a:srgbClr val="000000"/>
@@ -8169,68 +8226,11 @@
                           <a:effectLst/>
                           <a:latin typeface="Calibri" charset="0"/>
                         </a:rPr>
-                        <a:t>1685</a:t>
+                        <a:t>167</a:t>
                       </a:r>
                     </a:p>
                   </a:txBody>
-                  <a:tcPr marL="12522" marR="12522" marT="12522" marB="0" anchor="ctr">
-                    <a:lnL w="6350" cap="flat" cmpd="sng" algn="ctr">
-                      <a:solidFill>
-                        <a:srgbClr val="000000"/>
-                      </a:solidFill>
-                      <a:prstDash val="solid"/>
-                      <a:round/>
-                      <a:headEnd type="none" w="med" len="med"/>
-                      <a:tailEnd type="none" w="med" len="med"/>
-                    </a:lnL>
-                    <a:lnR w="6350" cap="flat" cmpd="sng" algn="ctr">
-                      <a:solidFill>
-                        <a:srgbClr val="000000"/>
-                      </a:solidFill>
-                      <a:prstDash val="solid"/>
-                      <a:round/>
-                      <a:headEnd type="none" w="med" len="med"/>
-                      <a:tailEnd type="none" w="med" len="med"/>
-                    </a:lnR>
-                    <a:lnT w="6350" cap="flat" cmpd="sng" algn="ctr">
-                      <a:solidFill>
-                        <a:srgbClr val="000000"/>
-                      </a:solidFill>
-                      <a:prstDash val="solid"/>
-                      <a:round/>
-                      <a:headEnd type="none" w="med" len="med"/>
-                      <a:tailEnd type="none" w="med" len="med"/>
-                    </a:lnT>
-                    <a:lnB w="6350" cap="flat" cmpd="sng" algn="ctr">
-                      <a:solidFill>
-                        <a:srgbClr val="000000"/>
-                      </a:solidFill>
-                      <a:prstDash val="solid"/>
-                      <a:round/>
-                      <a:headEnd type="none" w="med" len="med"/>
-                      <a:tailEnd type="none" w="med" len="med"/>
-                    </a:lnB>
-                  </a:tcPr>
-                </a:tc>
-                <a:tc>
-                  <a:txBody>
-                    <a:bodyPr/>
-                    <a:lstStyle/>
-                    <a:p>
-                      <a:pPr algn="ctr" fontAlgn="ctr"/>
-                      <a:r>
-                        <a:rPr lang="is-IS" sz="1200" b="1" i="0" u="none" strike="noStrike">
-                          <a:solidFill>
-                            <a:srgbClr val="000000"/>
-                          </a:solidFill>
-                          <a:effectLst/>
-                          <a:latin typeface="Calibri" charset="0"/>
-                        </a:rPr>
-                        <a:t>166</a:t>
-                      </a:r>
-                    </a:p>
-                  </a:txBody>
-                  <a:tcPr marL="12522" marR="12522" marT="12522" marB="0" anchor="ctr">
+                  <a:tcPr marL="8767" marR="8767" marT="8767" marB="0" anchor="ctr">
                     <a:lnL w="6350" cap="flat" cmpd="sng" algn="ctr">
                       <a:solidFill>
                         <a:srgbClr val="000000"/>
@@ -8283,11 +8283,11 @@
                           <a:effectLst/>
                           <a:latin typeface="Calibri" charset="0"/>
                         </a:rPr>
-                        <a:t>168</a:t>
+                        <a:t>169</a:t>
                       </a:r>
                     </a:p>
                   </a:txBody>
-                  <a:tcPr marL="12522" marR="12522" marT="12522" marB="0" anchor="ctr">
+                  <a:tcPr marL="8767" marR="8767" marT="8767" marB="0" anchor="ctr">
                     <a:lnL w="6350" cap="flat" cmpd="sng" algn="ctr">
                       <a:solidFill>
                         <a:srgbClr val="000000"/>

</xml_diff>

<commit_message>
The MoxR family ATPase was added to the list of queries
</commit_message>
<xml_diff>
--- a/images/statistics_table.pptx
+++ b/images/statistics_table.pptx
@@ -208,7 +208,7 @@
           <a:p>
             <a:fld id="{C571D33F-B151-5442-9D79-DA0A881D815F}" type="datetimeFigureOut">
               <a:rPr lang="en-US" smtClean="0"/>
-              <a:t>10/11/19</a:t>
+              <a:t>10/17/19</a:t>
             </a:fld>
             <a:endParaRPr lang="en-US"/>
           </a:p>
@@ -746,7 +746,7 @@
           <a:p>
             <a:fld id="{01197F44-DB72-474A-9754-31703E05C006}" type="datetimeFigureOut">
               <a:rPr lang="en-US" smtClean="0"/>
-              <a:t>10/11/19</a:t>
+              <a:t>10/17/19</a:t>
             </a:fld>
             <a:endParaRPr lang="en-US"/>
           </a:p>
@@ -916,7 +916,7 @@
           <a:p>
             <a:fld id="{01197F44-DB72-474A-9754-31703E05C006}" type="datetimeFigureOut">
               <a:rPr lang="en-US" smtClean="0"/>
-              <a:t>10/11/19</a:t>
+              <a:t>10/17/19</a:t>
             </a:fld>
             <a:endParaRPr lang="en-US"/>
           </a:p>
@@ -1096,7 +1096,7 @@
           <a:p>
             <a:fld id="{01197F44-DB72-474A-9754-31703E05C006}" type="datetimeFigureOut">
               <a:rPr lang="en-US" smtClean="0"/>
-              <a:t>10/11/19</a:t>
+              <a:t>10/17/19</a:t>
             </a:fld>
             <a:endParaRPr lang="en-US"/>
           </a:p>
@@ -1266,7 +1266,7 @@
           <a:p>
             <a:fld id="{01197F44-DB72-474A-9754-31703E05C006}" type="datetimeFigureOut">
               <a:rPr lang="en-US" smtClean="0"/>
-              <a:t>10/11/19</a:t>
+              <a:t>10/17/19</a:t>
             </a:fld>
             <a:endParaRPr lang="en-US"/>
           </a:p>
@@ -1512,7 +1512,7 @@
           <a:p>
             <a:fld id="{01197F44-DB72-474A-9754-31703E05C006}" type="datetimeFigureOut">
               <a:rPr lang="en-US" smtClean="0"/>
-              <a:t>10/11/19</a:t>
+              <a:t>10/17/19</a:t>
             </a:fld>
             <a:endParaRPr lang="en-US"/>
           </a:p>
@@ -1800,7 +1800,7 @@
           <a:p>
             <a:fld id="{01197F44-DB72-474A-9754-31703E05C006}" type="datetimeFigureOut">
               <a:rPr lang="en-US" smtClean="0"/>
-              <a:t>10/11/19</a:t>
+              <a:t>10/17/19</a:t>
             </a:fld>
             <a:endParaRPr lang="en-US"/>
           </a:p>
@@ -2222,7 +2222,7 @@
           <a:p>
             <a:fld id="{01197F44-DB72-474A-9754-31703E05C006}" type="datetimeFigureOut">
               <a:rPr lang="en-US" smtClean="0"/>
-              <a:t>10/11/19</a:t>
+              <a:t>10/17/19</a:t>
             </a:fld>
             <a:endParaRPr lang="en-US"/>
           </a:p>
@@ -2340,7 +2340,7 @@
           <a:p>
             <a:fld id="{01197F44-DB72-474A-9754-31703E05C006}" type="datetimeFigureOut">
               <a:rPr lang="en-US" smtClean="0"/>
-              <a:t>10/11/19</a:t>
+              <a:t>10/17/19</a:t>
             </a:fld>
             <a:endParaRPr lang="en-US"/>
           </a:p>
@@ -2435,7 +2435,7 @@
           <a:p>
             <a:fld id="{01197F44-DB72-474A-9754-31703E05C006}" type="datetimeFigureOut">
               <a:rPr lang="en-US" smtClean="0"/>
-              <a:t>10/11/19</a:t>
+              <a:t>10/17/19</a:t>
             </a:fld>
             <a:endParaRPr lang="en-US"/>
           </a:p>
@@ -2712,7 +2712,7 @@
           <a:p>
             <a:fld id="{01197F44-DB72-474A-9754-31703E05C006}" type="datetimeFigureOut">
               <a:rPr lang="en-US" smtClean="0"/>
-              <a:t>10/11/19</a:t>
+              <a:t>10/17/19</a:t>
             </a:fld>
             <a:endParaRPr lang="en-US"/>
           </a:p>
@@ -2965,7 +2965,7 @@
           <a:p>
             <a:fld id="{01197F44-DB72-474A-9754-31703E05C006}" type="datetimeFigureOut">
               <a:rPr lang="en-US" smtClean="0"/>
-              <a:t>10/11/19</a:t>
+              <a:t>10/17/19</a:t>
             </a:fld>
             <a:endParaRPr lang="en-US"/>
           </a:p>
@@ -3178,7 +3178,7 @@
           <a:p>
             <a:fld id="{01197F44-DB72-474A-9754-31703E05C006}" type="datetimeFigureOut">
               <a:rPr lang="en-US" smtClean="0"/>
-              <a:t>10/11/19</a:t>
+              <a:t>10/17/19</a:t>
             </a:fld>
             <a:endParaRPr lang="en-US"/>
           </a:p>
@@ -3555,36 +3555,36 @@
       </p:grpSpPr>
       <p:graphicFrame>
         <p:nvGraphicFramePr>
-          <p:cNvPr id="6" name="Table 5"/>
+          <p:cNvPr id="2" name="Table 1"/>
           <p:cNvGraphicFramePr>
             <a:graphicFrameLocks noGrp="1"/>
           </p:cNvGraphicFramePr>
           <p:nvPr>
             <p:extLst>
               <p:ext uri="{D42A27DB-BD31-4B8C-83A1-F6EECF244321}">
-                <p14:modId xmlns:p14="http://schemas.microsoft.com/office/powerpoint/2010/main" val="1803214743"/>
+                <p14:modId xmlns:p14="http://schemas.microsoft.com/office/powerpoint/2010/main" val="1148238839"/>
               </p:ext>
             </p:extLst>
           </p:nvPr>
         </p:nvGraphicFramePr>
         <p:xfrm>
-          <a:off x="84665" y="67734"/>
-          <a:ext cx="7154333" cy="3048000"/>
+          <a:off x="35984" y="33868"/>
+          <a:ext cx="7245348" cy="3138483"/>
         </p:xfrm>
         <a:graphic>
           <a:graphicData uri="http://schemas.openxmlformats.org/drawingml/2006/table">
             <a:tbl>
               <a:tblPr/>
               <a:tblGrid>
-                <a:gridCol w="607091"/>
-                <a:gridCol w="1503717"/>
-                <a:gridCol w="1008705"/>
-                <a:gridCol w="1008705"/>
-                <a:gridCol w="1008705"/>
-                <a:gridCol w="1008705"/>
-                <a:gridCol w="1008705"/>
+                <a:gridCol w="614815"/>
+                <a:gridCol w="1522848"/>
+                <a:gridCol w="1021537"/>
+                <a:gridCol w="1021537"/>
+                <a:gridCol w="1021537"/>
+                <a:gridCol w="1021537"/>
+                <a:gridCol w="1021537"/>
               </a:tblGrid>
-              <a:tr h="594636">
+              <a:tr h="638115">
                 <a:tc>
                   <a:txBody>
                     <a:bodyPr/>
@@ -3985,7 +3985,7 @@
                   </a:tcPr>
                 </a:tc>
               </a:tr>
-              <a:tr h="204447">
+              <a:tr h="208364">
                 <a:tc rowSpan="3">
                   <a:txBody>
                     <a:bodyPr/>
@@ -4386,7 +4386,7 @@
                   </a:tcPr>
                 </a:tc>
               </a:tr>
-              <a:tr h="204447">
+              <a:tr h="208364">
                 <a:tc vMerge="1">
                   <a:txBody>
                     <a:bodyPr/>
@@ -4740,7 +4740,7 @@
                   </a:tcPr>
                 </a:tc>
               </a:tr>
-              <a:tr h="204447">
+              <a:tr h="208364">
                 <a:tc vMerge="1">
                   <a:txBody>
                     <a:bodyPr/>
@@ -5094,7 +5094,7 @@
                   </a:tcPr>
                 </a:tc>
               </a:tr>
-              <a:tr h="204447">
+              <a:tr h="208364">
                 <a:tc rowSpan="8">
                   <a:txBody>
                     <a:bodyPr/>
@@ -5495,7 +5495,7 @@
                   </a:tcPr>
                 </a:tc>
               </a:tr>
-              <a:tr h="204447">
+              <a:tr h="208364">
                 <a:tc vMerge="1">
                   <a:txBody>
                     <a:bodyPr/>
@@ -5849,7 +5849,7 @@
                   </a:tcPr>
                 </a:tc>
               </a:tr>
-              <a:tr h="204447">
+              <a:tr h="208364">
                 <a:tc vMerge="1">
                   <a:txBody>
                     <a:bodyPr/>
@@ -6203,7 +6203,7 @@
                   </a:tcPr>
                 </a:tc>
               </a:tr>
-              <a:tr h="204447">
+              <a:tr h="208364">
                 <a:tc vMerge="1">
                   <a:txBody>
                     <a:bodyPr/>
@@ -6557,7 +6557,7 @@
                   </a:tcPr>
                 </a:tc>
               </a:tr>
-              <a:tr h="204447">
+              <a:tr h="208364">
                 <a:tc vMerge="1">
                   <a:txBody>
                     <a:bodyPr/>
@@ -6911,7 +6911,7 @@
                   </a:tcPr>
                 </a:tc>
               </a:tr>
-              <a:tr h="204447">
+              <a:tr h="208364">
                 <a:tc vMerge="1">
                   <a:txBody>
                     <a:bodyPr/>
@@ -7265,7 +7265,7 @@
                   </a:tcPr>
                 </a:tc>
               </a:tr>
-              <a:tr h="204447">
+              <a:tr h="208364">
                 <a:tc vMerge="1">
                   <a:txBody>
                     <a:bodyPr/>
@@ -7619,7 +7619,7 @@
                   </a:tcPr>
                 </a:tc>
               </a:tr>
-              <a:tr h="204447">
+              <a:tr h="208364">
                 <a:tc vMerge="1">
                   <a:txBody>
                     <a:bodyPr/>
@@ -7815,7 +7815,7 @@
                           <a:effectLst/>
                           <a:latin typeface="Calibri" charset="0"/>
                         </a:rPr>
-                        <a:t>46</a:t>
+                        <a:t>47</a:t>
                       </a:r>
                     </a:p>
                   </a:txBody>
@@ -7973,7 +7973,7 @@
                   </a:tcPr>
                 </a:tc>
               </a:tr>
-              <a:tr h="204447">
+              <a:tr h="208364">
                 <a:tc gridSpan="2">
                   <a:txBody>
                     <a:bodyPr/>
@@ -8169,7 +8169,7 @@
                           <a:effectLst/>
                           <a:latin typeface="Calibri" charset="0"/>
                         </a:rPr>
-                        <a:t>1475</a:t>
+                        <a:t>1476</a:t>
                       </a:r>
                     </a:p>
                   </a:txBody>

</xml_diff>

<commit_message>
Count chlD genes instead of medium subunit genes
</commit_message>
<xml_diff>
--- a/images/statistics_table.pptx
+++ b/images/statistics_table.pptx
@@ -208,7 +208,7 @@
           <a:p>
             <a:fld id="{C571D33F-B151-5442-9D79-DA0A881D815F}" type="datetimeFigureOut">
               <a:rPr lang="en-US" smtClean="0"/>
-              <a:t>10/17/19</a:t>
+              <a:t>11/23/19</a:t>
             </a:fld>
             <a:endParaRPr lang="en-US"/>
           </a:p>
@@ -746,7 +746,7 @@
           <a:p>
             <a:fld id="{01197F44-DB72-474A-9754-31703E05C006}" type="datetimeFigureOut">
               <a:rPr lang="en-US" smtClean="0"/>
-              <a:t>10/17/19</a:t>
+              <a:t>11/23/19</a:t>
             </a:fld>
             <a:endParaRPr lang="en-US"/>
           </a:p>
@@ -916,7 +916,7 @@
           <a:p>
             <a:fld id="{01197F44-DB72-474A-9754-31703E05C006}" type="datetimeFigureOut">
               <a:rPr lang="en-US" smtClean="0"/>
-              <a:t>10/17/19</a:t>
+              <a:t>11/23/19</a:t>
             </a:fld>
             <a:endParaRPr lang="en-US"/>
           </a:p>
@@ -1096,7 +1096,7 @@
           <a:p>
             <a:fld id="{01197F44-DB72-474A-9754-31703E05C006}" type="datetimeFigureOut">
               <a:rPr lang="en-US" smtClean="0"/>
-              <a:t>10/17/19</a:t>
+              <a:t>11/23/19</a:t>
             </a:fld>
             <a:endParaRPr lang="en-US"/>
           </a:p>
@@ -1266,7 +1266,7 @@
           <a:p>
             <a:fld id="{01197F44-DB72-474A-9754-31703E05C006}" type="datetimeFigureOut">
               <a:rPr lang="en-US" smtClean="0"/>
-              <a:t>10/17/19</a:t>
+              <a:t>11/23/19</a:t>
             </a:fld>
             <a:endParaRPr lang="en-US"/>
           </a:p>
@@ -1512,7 +1512,7 @@
           <a:p>
             <a:fld id="{01197F44-DB72-474A-9754-31703E05C006}" type="datetimeFigureOut">
               <a:rPr lang="en-US" smtClean="0"/>
-              <a:t>10/17/19</a:t>
+              <a:t>11/23/19</a:t>
             </a:fld>
             <a:endParaRPr lang="en-US"/>
           </a:p>
@@ -1800,7 +1800,7 @@
           <a:p>
             <a:fld id="{01197F44-DB72-474A-9754-31703E05C006}" type="datetimeFigureOut">
               <a:rPr lang="en-US" smtClean="0"/>
-              <a:t>10/17/19</a:t>
+              <a:t>11/23/19</a:t>
             </a:fld>
             <a:endParaRPr lang="en-US"/>
           </a:p>
@@ -2222,7 +2222,7 @@
           <a:p>
             <a:fld id="{01197F44-DB72-474A-9754-31703E05C006}" type="datetimeFigureOut">
               <a:rPr lang="en-US" smtClean="0"/>
-              <a:t>10/17/19</a:t>
+              <a:t>11/23/19</a:t>
             </a:fld>
             <a:endParaRPr lang="en-US"/>
           </a:p>
@@ -2340,7 +2340,7 @@
           <a:p>
             <a:fld id="{01197F44-DB72-474A-9754-31703E05C006}" type="datetimeFigureOut">
               <a:rPr lang="en-US" smtClean="0"/>
-              <a:t>10/17/19</a:t>
+              <a:t>11/23/19</a:t>
             </a:fld>
             <a:endParaRPr lang="en-US"/>
           </a:p>
@@ -2435,7 +2435,7 @@
           <a:p>
             <a:fld id="{01197F44-DB72-474A-9754-31703E05C006}" type="datetimeFigureOut">
               <a:rPr lang="en-US" smtClean="0"/>
-              <a:t>10/17/19</a:t>
+              <a:t>11/23/19</a:t>
             </a:fld>
             <a:endParaRPr lang="en-US"/>
           </a:p>
@@ -2712,7 +2712,7 @@
           <a:p>
             <a:fld id="{01197F44-DB72-474A-9754-31703E05C006}" type="datetimeFigureOut">
               <a:rPr lang="en-US" smtClean="0"/>
-              <a:t>10/17/19</a:t>
+              <a:t>11/23/19</a:t>
             </a:fld>
             <a:endParaRPr lang="en-US"/>
           </a:p>
@@ -2965,7 +2965,7 @@
           <a:p>
             <a:fld id="{01197F44-DB72-474A-9754-31703E05C006}" type="datetimeFigureOut">
               <a:rPr lang="en-US" smtClean="0"/>
-              <a:t>10/17/19</a:t>
+              <a:t>11/23/19</a:t>
             </a:fld>
             <a:endParaRPr lang="en-US"/>
           </a:p>
@@ -3178,7 +3178,7 @@
           <a:p>
             <a:fld id="{01197F44-DB72-474A-9754-31703E05C006}" type="datetimeFigureOut">
               <a:rPr lang="en-US" smtClean="0"/>
-              <a:t>10/17/19</a:t>
+              <a:t>11/23/19</a:t>
             </a:fld>
             <a:endParaRPr lang="en-US"/>
           </a:p>
@@ -3555,36 +3555,36 @@
       </p:grpSpPr>
       <p:graphicFrame>
         <p:nvGraphicFramePr>
-          <p:cNvPr id="2" name="Table 1"/>
+          <p:cNvPr id="3" name="Table 2"/>
           <p:cNvGraphicFramePr>
             <a:graphicFrameLocks noGrp="1"/>
           </p:cNvGraphicFramePr>
           <p:nvPr>
             <p:extLst>
               <p:ext uri="{D42A27DB-BD31-4B8C-83A1-F6EECF244321}">
-                <p14:modId xmlns:p14="http://schemas.microsoft.com/office/powerpoint/2010/main" val="1148238839"/>
+                <p14:modId xmlns:p14="http://schemas.microsoft.com/office/powerpoint/2010/main" val="1224425406"/>
               </p:ext>
             </p:extLst>
           </p:nvPr>
         </p:nvGraphicFramePr>
         <p:xfrm>
-          <a:off x="35984" y="33868"/>
-          <a:ext cx="7245348" cy="3138483"/>
+          <a:off x="25401" y="25404"/>
+          <a:ext cx="7247466" cy="3141129"/>
         </p:xfrm>
         <a:graphic>
           <a:graphicData uri="http://schemas.openxmlformats.org/drawingml/2006/table">
             <a:tbl>
               <a:tblPr/>
               <a:tblGrid>
-                <a:gridCol w="614815"/>
-                <a:gridCol w="1522848"/>
-                <a:gridCol w="1021537"/>
-                <a:gridCol w="1021537"/>
-                <a:gridCol w="1021537"/>
-                <a:gridCol w="1021537"/>
-                <a:gridCol w="1021537"/>
+                <a:gridCol w="622306"/>
+                <a:gridCol w="1541404"/>
+                <a:gridCol w="1033984"/>
+                <a:gridCol w="1033984"/>
+                <a:gridCol w="1033984"/>
+                <a:gridCol w="1033984"/>
+                <a:gridCol w="947820"/>
               </a:tblGrid>
-              <a:tr h="638115">
+              <a:tr h="495969">
                 <a:tc>
                   <a:txBody>
                     <a:bodyPr/>
@@ -3603,7 +3603,7 @@
                       </a:r>
                     </a:p>
                   </a:txBody>
-                  <a:tcPr marL="8767" marR="8767" marT="8767" marB="0" anchor="ctr">
+                  <a:tcPr marL="9267" marR="9267" marT="9267" marB="0" anchor="ctr">
                     <a:lnL w="6350" cap="flat" cmpd="sng" algn="ctr">
                       <a:solidFill>
                         <a:srgbClr val="000000"/>
@@ -3660,7 +3660,7 @@
                       </a:r>
                     </a:p>
                   </a:txBody>
-                  <a:tcPr marL="8767" marR="8767" marT="8767" marB="0" anchor="ctr">
+                  <a:tcPr marL="9267" marR="9267" marT="9267" marB="0" anchor="ctr">
                     <a:lnL w="6350" cap="flat" cmpd="sng" algn="ctr">
                       <a:solidFill>
                         <a:srgbClr val="000000"/>
@@ -3717,7 +3717,7 @@
                       </a:r>
                     </a:p>
                   </a:txBody>
-                  <a:tcPr marL="8767" marR="8767" marT="8767" marB="0" anchor="ctr">
+                  <a:tcPr marL="9267" marR="9267" marT="9267" marB="0" anchor="ctr">
                     <a:lnL w="6350" cap="flat" cmpd="sng" algn="ctr">
                       <a:solidFill>
                         <a:srgbClr val="000000"/>
@@ -3770,11 +3770,11 @@
                           <a:effectLst/>
                           <a:latin typeface="Calibri" charset="0"/>
                         </a:rPr>
-                        <a:t>Genomes with medium subunit genes</a:t>
+                        <a:t>Genomes with chlD genes</a:t>
                       </a:r>
                     </a:p>
                   </a:txBody>
-                  <a:tcPr marL="8767" marR="8767" marT="8767" marB="0" anchor="ctr">
+                  <a:tcPr marL="9267" marR="9267" marT="9267" marB="0" anchor="ctr">
                     <a:lnL w="6350" cap="flat" cmpd="sng" algn="ctr">
                       <a:solidFill>
                         <a:srgbClr val="000000"/>
@@ -3827,11 +3827,11 @@
                           <a:effectLst/>
                           <a:latin typeface="Calibri" charset="0"/>
                         </a:rPr>
-                        <a:t>Number of medium subunit genes</a:t>
+                        <a:t>Number of chlD genes</a:t>
                       </a:r>
                     </a:p>
                   </a:txBody>
-                  <a:tcPr marL="8767" marR="8767" marT="8767" marB="0" anchor="ctr">
+                  <a:tcPr marL="9267" marR="9267" marT="9267" marB="0" anchor="ctr">
                     <a:lnL w="6350" cap="flat" cmpd="sng" algn="ctr">
                       <a:solidFill>
                         <a:srgbClr val="000000"/>
@@ -3884,11 +3884,11 @@
                           <a:effectLst/>
                           <a:latin typeface="Calibri" charset="0"/>
                         </a:rPr>
-                        <a:t>Genomes with frameshifted chlD genes</a:t>
+                        <a:t>Genomes with fs-chlD genes</a:t>
                       </a:r>
                     </a:p>
                   </a:txBody>
-                  <a:tcPr marL="8767" marR="8767" marT="8767" marB="0" anchor="ctr">
+                  <a:tcPr marL="9267" marR="9267" marT="9267" marB="0" anchor="ctr">
                     <a:lnL w="6350" cap="flat" cmpd="sng" algn="ctr">
                       <a:solidFill>
                         <a:srgbClr val="000000"/>
@@ -3941,11 +3941,30 @@
                           <a:effectLst/>
                           <a:latin typeface="Calibri" charset="0"/>
                         </a:rPr>
-                        <a:t>Number of frameshifted chlD genes</a:t>
+                        <a:t>Number of</a:t>
                       </a:r>
-                    </a:p>
-                  </a:txBody>
-                  <a:tcPr marL="8767" marR="8767" marT="8767" marB="0" anchor="ctr">
+                      <a:br>
+                        <a:rPr lang="en-US" sz="1200" b="1" i="0" u="none" strike="noStrike">
+                          <a:solidFill>
+                            <a:srgbClr val="000000"/>
+                          </a:solidFill>
+                          <a:effectLst/>
+                          <a:latin typeface="Calibri" charset="0"/>
+                        </a:rPr>
+                      </a:br>
+                      <a:r>
+                        <a:rPr lang="en-US" sz="1200" b="1" i="0" u="none" strike="noStrike">
+                          <a:solidFill>
+                            <a:srgbClr val="000000"/>
+                          </a:solidFill>
+                          <a:effectLst/>
+                          <a:latin typeface="Calibri" charset="0"/>
+                        </a:rPr>
+                        <a:t>fs-chlD genes</a:t>
+                      </a:r>
+                    </a:p>
+                  </a:txBody>
+                  <a:tcPr marL="9267" marR="9267" marT="9267" marB="0" anchor="ctr">
                     <a:lnL w="6350" cap="flat" cmpd="sng" algn="ctr">
                       <a:solidFill>
                         <a:srgbClr val="000000"/>
@@ -3985,7 +4004,7 @@
                   </a:tcPr>
                 </a:tc>
               </a:tr>
-              <a:tr h="208364">
+              <a:tr h="220430">
                 <a:tc rowSpan="3">
                   <a:txBody>
                     <a:bodyPr/>
@@ -4004,7 +4023,7 @@
                       </a:r>
                     </a:p>
                   </a:txBody>
-                  <a:tcPr marL="8767" marR="8767" marT="8767" marB="0" anchor="ctr">
+                  <a:tcPr marL="9267" marR="9267" marT="9267" marB="0" anchor="ctr">
                     <a:lnL w="6350" cap="flat" cmpd="sng" algn="ctr">
                       <a:solidFill>
                         <a:srgbClr val="000000"/>
@@ -4061,7 +4080,7 @@
                       </a:r>
                     </a:p>
                   </a:txBody>
-                  <a:tcPr marL="8767" marR="8767" marT="8767" marB="0" anchor="ctr">
+                  <a:tcPr marL="9267" marR="9267" marT="9267" marB="0" anchor="ctr">
                     <a:lnL w="6350" cap="flat" cmpd="sng" algn="ctr">
                       <a:solidFill>
                         <a:srgbClr val="000000"/>
@@ -4118,7 +4137,7 @@
                       </a:r>
                     </a:p>
                   </a:txBody>
-                  <a:tcPr marL="8767" marR="8767" marT="8767" marB="0" anchor="ctr">
+                  <a:tcPr marL="9267" marR="9267" marT="9267" marB="0" anchor="ctr">
                     <a:lnL w="6350" cap="flat" cmpd="sng" algn="ctr">
                       <a:solidFill>
                         <a:srgbClr val="000000"/>
@@ -4175,7 +4194,7 @@
                       </a:r>
                     </a:p>
                   </a:txBody>
-                  <a:tcPr marL="8767" marR="8767" marT="8767" marB="0" anchor="ctr">
+                  <a:tcPr marL="9267" marR="9267" marT="9267" marB="0" anchor="ctr">
                     <a:lnL w="6350" cap="flat" cmpd="sng" algn="ctr">
                       <a:solidFill>
                         <a:srgbClr val="000000"/>
@@ -4232,7 +4251,7 @@
                       </a:r>
                     </a:p>
                   </a:txBody>
-                  <a:tcPr marL="8767" marR="8767" marT="8767" marB="0" anchor="ctr">
+                  <a:tcPr marL="9267" marR="9267" marT="9267" marB="0" anchor="ctr">
                     <a:lnL w="6350" cap="flat" cmpd="sng" algn="ctr">
                       <a:solidFill>
                         <a:srgbClr val="000000"/>
@@ -4289,7 +4308,7 @@
                       </a:r>
                     </a:p>
                   </a:txBody>
-                  <a:tcPr marL="8767" marR="8767" marT="8767" marB="0" anchor="ctr">
+                  <a:tcPr marL="9267" marR="9267" marT="9267" marB="0" anchor="ctr">
                     <a:lnL w="6350" cap="flat" cmpd="sng" algn="ctr">
                       <a:solidFill>
                         <a:srgbClr val="000000"/>
@@ -4346,7 +4365,7 @@
                       </a:r>
                     </a:p>
                   </a:txBody>
-                  <a:tcPr marL="8767" marR="8767" marT="8767" marB="0" anchor="ctr">
+                  <a:tcPr marL="9267" marR="9267" marT="9267" marB="0" anchor="ctr">
                     <a:lnL w="6350" cap="flat" cmpd="sng" algn="ctr">
                       <a:solidFill>
                         <a:srgbClr val="000000"/>
@@ -4386,7 +4405,7 @@
                   </a:tcPr>
                 </a:tc>
               </a:tr>
-              <a:tr h="208364">
+              <a:tr h="220430">
                 <a:tc vMerge="1">
                   <a:txBody>
                     <a:bodyPr/>
@@ -4415,7 +4434,7 @@
                       </a:r>
                     </a:p>
                   </a:txBody>
-                  <a:tcPr marL="8767" marR="8767" marT="8767" marB="0" anchor="ctr">
+                  <a:tcPr marL="9267" marR="9267" marT="9267" marB="0" anchor="ctr">
                     <a:lnL w="6350" cap="flat" cmpd="sng" algn="ctr">
                       <a:solidFill>
                         <a:srgbClr val="000000"/>
@@ -4472,7 +4491,7 @@
                       </a:r>
                     </a:p>
                   </a:txBody>
-                  <a:tcPr marL="8767" marR="8767" marT="8767" marB="0" anchor="ctr">
+                  <a:tcPr marL="9267" marR="9267" marT="9267" marB="0" anchor="ctr">
                     <a:lnL w="6350" cap="flat" cmpd="sng" algn="ctr">
                       <a:solidFill>
                         <a:srgbClr val="000000"/>
@@ -4529,7 +4548,7 @@
                       </a:r>
                     </a:p>
                   </a:txBody>
-                  <a:tcPr marL="8767" marR="8767" marT="8767" marB="0" anchor="ctr">
+                  <a:tcPr marL="9267" marR="9267" marT="9267" marB="0" anchor="ctr">
                     <a:lnL w="6350" cap="flat" cmpd="sng" algn="ctr">
                       <a:solidFill>
                         <a:srgbClr val="000000"/>
@@ -4586,7 +4605,7 @@
                       </a:r>
                     </a:p>
                   </a:txBody>
-                  <a:tcPr marL="8767" marR="8767" marT="8767" marB="0" anchor="ctr">
+                  <a:tcPr marL="9267" marR="9267" marT="9267" marB="0" anchor="ctr">
                     <a:lnL w="6350" cap="flat" cmpd="sng" algn="ctr">
                       <a:solidFill>
                         <a:srgbClr val="000000"/>
@@ -4643,7 +4662,7 @@
                       </a:r>
                     </a:p>
                   </a:txBody>
-                  <a:tcPr marL="8767" marR="8767" marT="8767" marB="0" anchor="ctr">
+                  <a:tcPr marL="9267" marR="9267" marT="9267" marB="0" anchor="ctr">
                     <a:lnL w="6350" cap="flat" cmpd="sng" algn="ctr">
                       <a:solidFill>
                         <a:srgbClr val="000000"/>
@@ -4700,7 +4719,7 @@
                       </a:r>
                     </a:p>
                   </a:txBody>
-                  <a:tcPr marL="8767" marR="8767" marT="8767" marB="0" anchor="ctr">
+                  <a:tcPr marL="9267" marR="9267" marT="9267" marB="0" anchor="ctr">
                     <a:lnL w="6350" cap="flat" cmpd="sng" algn="ctr">
                       <a:solidFill>
                         <a:srgbClr val="000000"/>
@@ -4740,7 +4759,7 @@
                   </a:tcPr>
                 </a:tc>
               </a:tr>
-              <a:tr h="208364">
+              <a:tr h="220430">
                 <a:tc vMerge="1">
                   <a:txBody>
                     <a:bodyPr/>
@@ -4769,7 +4788,7 @@
                       </a:r>
                     </a:p>
                   </a:txBody>
-                  <a:tcPr marL="8767" marR="8767" marT="8767" marB="0" anchor="ctr">
+                  <a:tcPr marL="9267" marR="9267" marT="9267" marB="0" anchor="ctr">
                     <a:lnL w="6350" cap="flat" cmpd="sng" algn="ctr">
                       <a:solidFill>
                         <a:srgbClr val="000000"/>
@@ -4826,7 +4845,7 @@
                       </a:r>
                     </a:p>
                   </a:txBody>
-                  <a:tcPr marL="8767" marR="8767" marT="8767" marB="0" anchor="ctr">
+                  <a:tcPr marL="9267" marR="9267" marT="9267" marB="0" anchor="ctr">
                     <a:lnL w="6350" cap="flat" cmpd="sng" algn="ctr">
                       <a:solidFill>
                         <a:srgbClr val="000000"/>
@@ -4883,7 +4902,7 @@
                       </a:r>
                     </a:p>
                   </a:txBody>
-                  <a:tcPr marL="8767" marR="8767" marT="8767" marB="0" anchor="ctr">
+                  <a:tcPr marL="9267" marR="9267" marT="9267" marB="0" anchor="ctr">
                     <a:lnL w="6350" cap="flat" cmpd="sng" algn="ctr">
                       <a:solidFill>
                         <a:srgbClr val="000000"/>
@@ -4940,7 +4959,7 @@
                       </a:r>
                     </a:p>
                   </a:txBody>
-                  <a:tcPr marL="8767" marR="8767" marT="8767" marB="0" anchor="ctr">
+                  <a:tcPr marL="9267" marR="9267" marT="9267" marB="0" anchor="ctr">
                     <a:lnL w="6350" cap="flat" cmpd="sng" algn="ctr">
                       <a:solidFill>
                         <a:srgbClr val="000000"/>
@@ -4997,7 +5016,7 @@
                       </a:r>
                     </a:p>
                   </a:txBody>
-                  <a:tcPr marL="8767" marR="8767" marT="8767" marB="0" anchor="ctr">
+                  <a:tcPr marL="9267" marR="9267" marT="9267" marB="0" anchor="ctr">
                     <a:lnL w="6350" cap="flat" cmpd="sng" algn="ctr">
                       <a:solidFill>
                         <a:srgbClr val="000000"/>
@@ -5054,7 +5073,7 @@
                       </a:r>
                     </a:p>
                   </a:txBody>
-                  <a:tcPr marL="8767" marR="8767" marT="8767" marB="0" anchor="ctr">
+                  <a:tcPr marL="9267" marR="9267" marT="9267" marB="0" anchor="ctr">
                     <a:lnL w="6350" cap="flat" cmpd="sng" algn="ctr">
                       <a:solidFill>
                         <a:srgbClr val="000000"/>
@@ -5094,7 +5113,7 @@
                   </a:tcPr>
                 </a:tc>
               </a:tr>
-              <a:tr h="208364">
+              <a:tr h="220430">
                 <a:tc rowSpan="8">
                   <a:txBody>
                     <a:bodyPr/>
@@ -5113,7 +5132,7 @@
                       </a:r>
                     </a:p>
                   </a:txBody>
-                  <a:tcPr marL="8767" marR="8767" marT="8767" marB="0" anchor="ctr">
+                  <a:tcPr marL="9267" marR="9267" marT="9267" marB="0" anchor="ctr">
                     <a:lnL w="6350" cap="flat" cmpd="sng" algn="ctr">
                       <a:solidFill>
                         <a:srgbClr val="000000"/>
@@ -5170,7 +5189,7 @@
                       </a:r>
                     </a:p>
                   </a:txBody>
-                  <a:tcPr marL="8767" marR="8767" marT="8767" marB="0" anchor="ctr">
+                  <a:tcPr marL="9267" marR="9267" marT="9267" marB="0" anchor="ctr">
                     <a:lnL w="6350" cap="flat" cmpd="sng" algn="ctr">
                       <a:solidFill>
                         <a:srgbClr val="000000"/>
@@ -5227,7 +5246,7 @@
                       </a:r>
                     </a:p>
                   </a:txBody>
-                  <a:tcPr marL="8767" marR="8767" marT="8767" marB="0" anchor="ctr">
+                  <a:tcPr marL="9267" marR="9267" marT="9267" marB="0" anchor="ctr">
                     <a:lnL w="6350" cap="flat" cmpd="sng" algn="ctr">
                       <a:solidFill>
                         <a:srgbClr val="000000"/>
@@ -5284,7 +5303,7 @@
                       </a:r>
                     </a:p>
                   </a:txBody>
-                  <a:tcPr marL="8767" marR="8767" marT="8767" marB="0" anchor="ctr">
+                  <a:tcPr marL="9267" marR="9267" marT="9267" marB="0" anchor="ctr">
                     <a:lnL w="6350" cap="flat" cmpd="sng" algn="ctr">
                       <a:solidFill>
                         <a:srgbClr val="000000"/>
@@ -5330,18 +5349,18 @@
                     <a:p>
                       <a:pPr algn="ctr" fontAlgn="ctr"/>
                       <a:r>
-                        <a:rPr lang="fi-FI" sz="1200" b="0" i="0" u="none" strike="noStrike">
+                        <a:rPr lang="is-IS" sz="1200" b="0" i="0" u="none" strike="noStrike">
                           <a:solidFill>
                             <a:srgbClr val="000000"/>
                           </a:solidFill>
                           <a:effectLst/>
                           <a:latin typeface="Calibri" charset="0"/>
                         </a:rPr>
-                        <a:t>502</a:t>
+                        <a:t>337</a:t>
                       </a:r>
                     </a:p>
                   </a:txBody>
-                  <a:tcPr marL="8767" marR="8767" marT="8767" marB="0" anchor="ctr">
+                  <a:tcPr marL="9267" marR="9267" marT="9267" marB="0" anchor="ctr">
                     <a:lnL w="6350" cap="flat" cmpd="sng" algn="ctr">
                       <a:solidFill>
                         <a:srgbClr val="000000"/>
@@ -5398,7 +5417,7 @@
                       </a:r>
                     </a:p>
                   </a:txBody>
-                  <a:tcPr marL="8767" marR="8767" marT="8767" marB="0" anchor="ctr">
+                  <a:tcPr marL="9267" marR="9267" marT="9267" marB="0" anchor="ctr">
                     <a:lnL w="6350" cap="flat" cmpd="sng" algn="ctr">
                       <a:solidFill>
                         <a:srgbClr val="000000"/>
@@ -5455,7 +5474,7 @@
                       </a:r>
                     </a:p>
                   </a:txBody>
-                  <a:tcPr marL="8767" marR="8767" marT="8767" marB="0" anchor="ctr">
+                  <a:tcPr marL="9267" marR="9267" marT="9267" marB="0" anchor="ctr">
                     <a:lnL w="6350" cap="flat" cmpd="sng" algn="ctr">
                       <a:solidFill>
                         <a:srgbClr val="000000"/>
@@ -5495,7 +5514,7 @@
                   </a:tcPr>
                 </a:tc>
               </a:tr>
-              <a:tr h="208364">
+              <a:tr h="220430">
                 <a:tc vMerge="1">
                   <a:txBody>
                     <a:bodyPr/>
@@ -5524,7 +5543,7 @@
                       </a:r>
                     </a:p>
                   </a:txBody>
-                  <a:tcPr marL="8767" marR="8767" marT="8767" marB="0" anchor="ctr">
+                  <a:tcPr marL="9267" marR="9267" marT="9267" marB="0" anchor="ctr">
                     <a:lnL w="6350" cap="flat" cmpd="sng" algn="ctr">
                       <a:solidFill>
                         <a:srgbClr val="000000"/>
@@ -5581,7 +5600,7 @@
                       </a:r>
                     </a:p>
                   </a:txBody>
-                  <a:tcPr marL="8767" marR="8767" marT="8767" marB="0" anchor="ctr">
+                  <a:tcPr marL="9267" marR="9267" marT="9267" marB="0" anchor="ctr">
                     <a:lnL w="6350" cap="flat" cmpd="sng" algn="ctr">
                       <a:solidFill>
                         <a:srgbClr val="000000"/>
@@ -5638,7 +5657,7 @@
                       </a:r>
                     </a:p>
                   </a:txBody>
-                  <a:tcPr marL="8767" marR="8767" marT="8767" marB="0" anchor="ctr">
+                  <a:tcPr marL="9267" marR="9267" marT="9267" marB="0" anchor="ctr">
                     <a:lnL w="6350" cap="flat" cmpd="sng" algn="ctr">
                       <a:solidFill>
                         <a:srgbClr val="000000"/>
@@ -5684,18 +5703,18 @@
                     <a:p>
                       <a:pPr algn="ctr" fontAlgn="ctr"/>
                       <a:r>
-                        <a:rPr lang="cs-CZ" sz="1200" b="0" i="0" u="none" strike="noStrike">
+                        <a:rPr lang="is-IS" sz="1200" b="0" i="0" u="none" strike="noStrike">
                           <a:solidFill>
                             <a:srgbClr val="000000"/>
                           </a:solidFill>
                           <a:effectLst/>
                           <a:latin typeface="Calibri" charset="0"/>
                         </a:rPr>
-                        <a:t>583</a:t>
+                        <a:t>572</a:t>
                       </a:r>
                     </a:p>
                   </a:txBody>
-                  <a:tcPr marL="8767" marR="8767" marT="8767" marB="0" anchor="ctr">
+                  <a:tcPr marL="9267" marR="9267" marT="9267" marB="0" anchor="ctr">
                     <a:lnL w="6350" cap="flat" cmpd="sng" algn="ctr">
                       <a:solidFill>
                         <a:srgbClr val="000000"/>
@@ -5752,7 +5771,7 @@
                       </a:r>
                     </a:p>
                   </a:txBody>
-                  <a:tcPr marL="8767" marR="8767" marT="8767" marB="0" anchor="ctr">
+                  <a:tcPr marL="9267" marR="9267" marT="9267" marB="0" anchor="ctr">
                     <a:lnL w="6350" cap="flat" cmpd="sng" algn="ctr">
                       <a:solidFill>
                         <a:srgbClr val="000000"/>
@@ -5809,7 +5828,7 @@
                       </a:r>
                     </a:p>
                   </a:txBody>
-                  <a:tcPr marL="8767" marR="8767" marT="8767" marB="0" anchor="ctr">
+                  <a:tcPr marL="9267" marR="9267" marT="9267" marB="0" anchor="ctr">
                     <a:lnL w="6350" cap="flat" cmpd="sng" algn="ctr">
                       <a:solidFill>
                         <a:srgbClr val="000000"/>
@@ -5849,7 +5868,7 @@
                   </a:tcPr>
                 </a:tc>
               </a:tr>
-              <a:tr h="208364">
+              <a:tr h="220430">
                 <a:tc vMerge="1">
                   <a:txBody>
                     <a:bodyPr/>
@@ -5878,7 +5897,7 @@
                       </a:r>
                     </a:p>
                   </a:txBody>
-                  <a:tcPr marL="8767" marR="8767" marT="8767" marB="0" anchor="ctr">
+                  <a:tcPr marL="9267" marR="9267" marT="9267" marB="0" anchor="ctr">
                     <a:lnL w="6350" cap="flat" cmpd="sng" algn="ctr">
                       <a:solidFill>
                         <a:srgbClr val="000000"/>
@@ -5935,7 +5954,7 @@
                       </a:r>
                     </a:p>
                   </a:txBody>
-                  <a:tcPr marL="8767" marR="8767" marT="8767" marB="0" anchor="ctr">
+                  <a:tcPr marL="9267" marR="9267" marT="9267" marB="0" anchor="ctr">
                     <a:lnL w="6350" cap="flat" cmpd="sng" algn="ctr">
                       <a:solidFill>
                         <a:srgbClr val="000000"/>
@@ -5992,7 +6011,7 @@
                       </a:r>
                     </a:p>
                   </a:txBody>
-                  <a:tcPr marL="8767" marR="8767" marT="8767" marB="0" anchor="ctr">
+                  <a:tcPr marL="9267" marR="9267" marT="9267" marB="0" anchor="ctr">
                     <a:lnL w="6350" cap="flat" cmpd="sng" algn="ctr">
                       <a:solidFill>
                         <a:srgbClr val="000000"/>
@@ -6049,7 +6068,7 @@
                       </a:r>
                     </a:p>
                   </a:txBody>
-                  <a:tcPr marL="8767" marR="8767" marT="8767" marB="0" anchor="ctr">
+                  <a:tcPr marL="9267" marR="9267" marT="9267" marB="0" anchor="ctr">
                     <a:lnL w="6350" cap="flat" cmpd="sng" algn="ctr">
                       <a:solidFill>
                         <a:srgbClr val="000000"/>
@@ -6106,7 +6125,7 @@
                       </a:r>
                     </a:p>
                   </a:txBody>
-                  <a:tcPr marL="8767" marR="8767" marT="8767" marB="0" anchor="ctr">
+                  <a:tcPr marL="9267" marR="9267" marT="9267" marB="0" anchor="ctr">
                     <a:lnL w="6350" cap="flat" cmpd="sng" algn="ctr">
                       <a:solidFill>
                         <a:srgbClr val="000000"/>
@@ -6163,7 +6182,7 @@
                       </a:r>
                     </a:p>
                   </a:txBody>
-                  <a:tcPr marL="8767" marR="8767" marT="8767" marB="0" anchor="ctr">
+                  <a:tcPr marL="9267" marR="9267" marT="9267" marB="0" anchor="ctr">
                     <a:lnL w="6350" cap="flat" cmpd="sng" algn="ctr">
                       <a:solidFill>
                         <a:srgbClr val="000000"/>
@@ -6203,7 +6222,7 @@
                   </a:tcPr>
                 </a:tc>
               </a:tr>
-              <a:tr h="208364">
+              <a:tr h="220430">
                 <a:tc vMerge="1">
                   <a:txBody>
                     <a:bodyPr/>
@@ -6232,7 +6251,7 @@
                       </a:r>
                     </a:p>
                   </a:txBody>
-                  <a:tcPr marL="8767" marR="8767" marT="8767" marB="0" anchor="ctr">
+                  <a:tcPr marL="9267" marR="9267" marT="9267" marB="0" anchor="ctr">
                     <a:lnL w="6350" cap="flat" cmpd="sng" algn="ctr">
                       <a:solidFill>
                         <a:srgbClr val="000000"/>
@@ -6289,7 +6308,7 @@
                       </a:r>
                     </a:p>
                   </a:txBody>
-                  <a:tcPr marL="8767" marR="8767" marT="8767" marB="0" anchor="ctr">
+                  <a:tcPr marL="9267" marR="9267" marT="9267" marB="0" anchor="ctr">
                     <a:lnL w="6350" cap="flat" cmpd="sng" algn="ctr">
                       <a:solidFill>
                         <a:srgbClr val="000000"/>
@@ -6346,7 +6365,7 @@
                       </a:r>
                     </a:p>
                   </a:txBody>
-                  <a:tcPr marL="8767" marR="8767" marT="8767" marB="0" anchor="ctr">
+                  <a:tcPr marL="9267" marR="9267" marT="9267" marB="0" anchor="ctr">
                     <a:lnL w="6350" cap="flat" cmpd="sng" algn="ctr">
                       <a:solidFill>
                         <a:srgbClr val="000000"/>
@@ -6403,7 +6422,7 @@
                       </a:r>
                     </a:p>
                   </a:txBody>
-                  <a:tcPr marL="8767" marR="8767" marT="8767" marB="0" anchor="ctr">
+                  <a:tcPr marL="9267" marR="9267" marT="9267" marB="0" anchor="ctr">
                     <a:lnL w="6350" cap="flat" cmpd="sng" algn="ctr">
                       <a:solidFill>
                         <a:srgbClr val="000000"/>
@@ -6460,7 +6479,7 @@
                       </a:r>
                     </a:p>
                   </a:txBody>
-                  <a:tcPr marL="8767" marR="8767" marT="8767" marB="0" anchor="ctr">
+                  <a:tcPr marL="9267" marR="9267" marT="9267" marB="0" anchor="ctr">
                     <a:lnL w="6350" cap="flat" cmpd="sng" algn="ctr">
                       <a:solidFill>
                         <a:srgbClr val="000000"/>
@@ -6517,7 +6536,7 @@
                       </a:r>
                     </a:p>
                   </a:txBody>
-                  <a:tcPr marL="8767" marR="8767" marT="8767" marB="0" anchor="ctr">
+                  <a:tcPr marL="9267" marR="9267" marT="9267" marB="0" anchor="ctr">
                     <a:lnL w="6350" cap="flat" cmpd="sng" algn="ctr">
                       <a:solidFill>
                         <a:srgbClr val="000000"/>
@@ -6557,7 +6576,7 @@
                   </a:tcPr>
                 </a:tc>
               </a:tr>
-              <a:tr h="208364">
+              <a:tr h="220430">
                 <a:tc vMerge="1">
                   <a:txBody>
                     <a:bodyPr/>
@@ -6586,7 +6605,7 @@
                       </a:r>
                     </a:p>
                   </a:txBody>
-                  <a:tcPr marL="8767" marR="8767" marT="8767" marB="0" anchor="ctr">
+                  <a:tcPr marL="9267" marR="9267" marT="9267" marB="0" anchor="ctr">
                     <a:lnL w="6350" cap="flat" cmpd="sng" algn="ctr">
                       <a:solidFill>
                         <a:srgbClr val="000000"/>
@@ -6643,7 +6662,7 @@
                       </a:r>
                     </a:p>
                   </a:txBody>
-                  <a:tcPr marL="8767" marR="8767" marT="8767" marB="0" anchor="ctr">
+                  <a:tcPr marL="9267" marR="9267" marT="9267" marB="0" anchor="ctr">
                     <a:lnL w="6350" cap="flat" cmpd="sng" algn="ctr">
                       <a:solidFill>
                         <a:srgbClr val="000000"/>
@@ -6700,7 +6719,7 @@
                       </a:r>
                     </a:p>
                   </a:txBody>
-                  <a:tcPr marL="8767" marR="8767" marT="8767" marB="0" anchor="ctr">
+                  <a:tcPr marL="9267" marR="9267" marT="9267" marB="0" anchor="ctr">
                     <a:lnL w="6350" cap="flat" cmpd="sng" algn="ctr">
                       <a:solidFill>
                         <a:srgbClr val="000000"/>
@@ -6757,7 +6776,7 @@
                       </a:r>
                     </a:p>
                   </a:txBody>
-                  <a:tcPr marL="8767" marR="8767" marT="8767" marB="0" anchor="ctr">
+                  <a:tcPr marL="9267" marR="9267" marT="9267" marB="0" anchor="ctr">
                     <a:lnL w="6350" cap="flat" cmpd="sng" algn="ctr">
                       <a:solidFill>
                         <a:srgbClr val="000000"/>
@@ -6814,7 +6833,7 @@
                       </a:r>
                     </a:p>
                   </a:txBody>
-                  <a:tcPr marL="8767" marR="8767" marT="8767" marB="0" anchor="ctr">
+                  <a:tcPr marL="9267" marR="9267" marT="9267" marB="0" anchor="ctr">
                     <a:lnL w="6350" cap="flat" cmpd="sng" algn="ctr">
                       <a:solidFill>
                         <a:srgbClr val="000000"/>
@@ -6871,7 +6890,7 @@
                       </a:r>
                     </a:p>
                   </a:txBody>
-                  <a:tcPr marL="8767" marR="8767" marT="8767" marB="0" anchor="ctr">
+                  <a:tcPr marL="9267" marR="9267" marT="9267" marB="0" anchor="ctr">
                     <a:lnL w="6350" cap="flat" cmpd="sng" algn="ctr">
                       <a:solidFill>
                         <a:srgbClr val="000000"/>
@@ -6911,7 +6930,7 @@
                   </a:tcPr>
                 </a:tc>
               </a:tr>
-              <a:tr h="208364">
+              <a:tr h="220430">
                 <a:tc vMerge="1">
                   <a:txBody>
                     <a:bodyPr/>
@@ -6940,7 +6959,7 @@
                       </a:r>
                     </a:p>
                   </a:txBody>
-                  <a:tcPr marL="8767" marR="8767" marT="8767" marB="0" anchor="ctr">
+                  <a:tcPr marL="9267" marR="9267" marT="9267" marB="0" anchor="ctr">
                     <a:lnL w="6350" cap="flat" cmpd="sng" algn="ctr">
                       <a:solidFill>
                         <a:srgbClr val="000000"/>
@@ -6997,7 +7016,7 @@
                       </a:r>
                     </a:p>
                   </a:txBody>
-                  <a:tcPr marL="8767" marR="8767" marT="8767" marB="0" anchor="ctr">
+                  <a:tcPr marL="9267" marR="9267" marT="9267" marB="0" anchor="ctr">
                     <a:lnL w="6350" cap="flat" cmpd="sng" algn="ctr">
                       <a:solidFill>
                         <a:srgbClr val="000000"/>
@@ -7054,7 +7073,7 @@
                       </a:r>
                     </a:p>
                   </a:txBody>
-                  <a:tcPr marL="8767" marR="8767" marT="8767" marB="0" anchor="ctr">
+                  <a:tcPr marL="9267" marR="9267" marT="9267" marB="0" anchor="ctr">
                     <a:lnL w="6350" cap="flat" cmpd="sng" algn="ctr">
                       <a:solidFill>
                         <a:srgbClr val="000000"/>
@@ -7111,7 +7130,7 @@
                       </a:r>
                     </a:p>
                   </a:txBody>
-                  <a:tcPr marL="8767" marR="8767" marT="8767" marB="0" anchor="ctr">
+                  <a:tcPr marL="9267" marR="9267" marT="9267" marB="0" anchor="ctr">
                     <a:lnL w="6350" cap="flat" cmpd="sng" algn="ctr">
                       <a:solidFill>
                         <a:srgbClr val="000000"/>
@@ -7168,7 +7187,7 @@
                       </a:r>
                     </a:p>
                   </a:txBody>
-                  <a:tcPr marL="8767" marR="8767" marT="8767" marB="0" anchor="ctr">
+                  <a:tcPr marL="9267" marR="9267" marT="9267" marB="0" anchor="ctr">
                     <a:lnL w="6350" cap="flat" cmpd="sng" algn="ctr">
                       <a:solidFill>
                         <a:srgbClr val="000000"/>
@@ -7225,7 +7244,7 @@
                       </a:r>
                     </a:p>
                   </a:txBody>
-                  <a:tcPr marL="8767" marR="8767" marT="8767" marB="0" anchor="ctr">
+                  <a:tcPr marL="9267" marR="9267" marT="9267" marB="0" anchor="ctr">
                     <a:lnL w="6350" cap="flat" cmpd="sng" algn="ctr">
                       <a:solidFill>
                         <a:srgbClr val="000000"/>
@@ -7265,7 +7284,7 @@
                   </a:tcPr>
                 </a:tc>
               </a:tr>
-              <a:tr h="208364">
+              <a:tr h="220430">
                 <a:tc vMerge="1">
                   <a:txBody>
                     <a:bodyPr/>
@@ -7294,7 +7313,7 @@
                       </a:r>
                     </a:p>
                   </a:txBody>
-                  <a:tcPr marL="8767" marR="8767" marT="8767" marB="0" anchor="ctr">
+                  <a:tcPr marL="9267" marR="9267" marT="9267" marB="0" anchor="ctr">
                     <a:lnL w="6350" cap="flat" cmpd="sng" algn="ctr">
                       <a:solidFill>
                         <a:srgbClr val="000000"/>
@@ -7351,7 +7370,7 @@
                       </a:r>
                     </a:p>
                   </a:txBody>
-                  <a:tcPr marL="8767" marR="8767" marT="8767" marB="0" anchor="ctr">
+                  <a:tcPr marL="9267" marR="9267" marT="9267" marB="0" anchor="ctr">
                     <a:lnL w="6350" cap="flat" cmpd="sng" algn="ctr">
                       <a:solidFill>
                         <a:srgbClr val="000000"/>
@@ -7408,7 +7427,7 @@
                       </a:r>
                     </a:p>
                   </a:txBody>
-                  <a:tcPr marL="8767" marR="8767" marT="8767" marB="0" anchor="ctr">
+                  <a:tcPr marL="9267" marR="9267" marT="9267" marB="0" anchor="ctr">
                     <a:lnL w="6350" cap="flat" cmpd="sng" algn="ctr">
                       <a:solidFill>
                         <a:srgbClr val="000000"/>
@@ -7465,7 +7484,7 @@
                       </a:r>
                     </a:p>
                   </a:txBody>
-                  <a:tcPr marL="8767" marR="8767" marT="8767" marB="0" anchor="ctr">
+                  <a:tcPr marL="9267" marR="9267" marT="9267" marB="0" anchor="ctr">
                     <a:lnL w="6350" cap="flat" cmpd="sng" algn="ctr">
                       <a:solidFill>
                         <a:srgbClr val="000000"/>
@@ -7522,7 +7541,7 @@
                       </a:r>
                     </a:p>
                   </a:txBody>
-                  <a:tcPr marL="8767" marR="8767" marT="8767" marB="0" anchor="ctr">
+                  <a:tcPr marL="9267" marR="9267" marT="9267" marB="0" anchor="ctr">
                     <a:lnL w="6350" cap="flat" cmpd="sng" algn="ctr">
                       <a:solidFill>
                         <a:srgbClr val="000000"/>
@@ -7579,7 +7598,7 @@
                       </a:r>
                     </a:p>
                   </a:txBody>
-                  <a:tcPr marL="8767" marR="8767" marT="8767" marB="0" anchor="ctr">
+                  <a:tcPr marL="9267" marR="9267" marT="9267" marB="0" anchor="ctr">
                     <a:lnL w="6350" cap="flat" cmpd="sng" algn="ctr">
                       <a:solidFill>
                         <a:srgbClr val="000000"/>
@@ -7619,7 +7638,7 @@
                   </a:tcPr>
                 </a:tc>
               </a:tr>
-              <a:tr h="208364">
+              <a:tr h="220430">
                 <a:tc vMerge="1">
                   <a:txBody>
                     <a:bodyPr/>
@@ -7648,7 +7667,7 @@
                       </a:r>
                     </a:p>
                   </a:txBody>
-                  <a:tcPr marL="8767" marR="8767" marT="8767" marB="0" anchor="ctr">
+                  <a:tcPr marL="9267" marR="9267" marT="9267" marB="0" anchor="ctr">
                     <a:lnL w="6350" cap="flat" cmpd="sng" algn="ctr">
                       <a:solidFill>
                         <a:srgbClr val="000000"/>
@@ -7705,7 +7724,7 @@
                       </a:r>
                     </a:p>
                   </a:txBody>
-                  <a:tcPr marL="8767" marR="8767" marT="8767" marB="0" anchor="ctr">
+                  <a:tcPr marL="9267" marR="9267" marT="9267" marB="0" anchor="ctr">
                     <a:lnL w="6350" cap="flat" cmpd="sng" algn="ctr">
                       <a:solidFill>
                         <a:srgbClr val="000000"/>
@@ -7762,7 +7781,7 @@
                       </a:r>
                     </a:p>
                   </a:txBody>
-                  <a:tcPr marL="8767" marR="8767" marT="8767" marB="0" anchor="ctr">
+                  <a:tcPr marL="9267" marR="9267" marT="9267" marB="0" anchor="ctr">
                     <a:lnL w="6350" cap="flat" cmpd="sng" algn="ctr">
                       <a:solidFill>
                         <a:srgbClr val="000000"/>
@@ -7819,7 +7838,7 @@
                       </a:r>
                     </a:p>
                   </a:txBody>
-                  <a:tcPr marL="8767" marR="8767" marT="8767" marB="0" anchor="ctr">
+                  <a:tcPr marL="9267" marR="9267" marT="9267" marB="0" anchor="ctr">
                     <a:lnL w="6350" cap="flat" cmpd="sng" algn="ctr">
                       <a:solidFill>
                         <a:srgbClr val="000000"/>
@@ -7876,7 +7895,7 @@
                       </a:r>
                     </a:p>
                   </a:txBody>
-                  <a:tcPr marL="8767" marR="8767" marT="8767" marB="0" anchor="ctr">
+                  <a:tcPr marL="9267" marR="9267" marT="9267" marB="0" anchor="ctr">
                     <a:lnL w="6350" cap="flat" cmpd="sng" algn="ctr">
                       <a:solidFill>
                         <a:srgbClr val="000000"/>
@@ -7933,7 +7952,7 @@
                       </a:r>
                     </a:p>
                   </a:txBody>
-                  <a:tcPr marL="8767" marR="8767" marT="8767" marB="0" anchor="ctr">
+                  <a:tcPr marL="9267" marR="9267" marT="9267" marB="0" anchor="ctr">
                     <a:lnL w="6350" cap="flat" cmpd="sng" algn="ctr">
                       <a:solidFill>
                         <a:srgbClr val="000000"/>
@@ -7973,7 +7992,7 @@
                   </a:tcPr>
                 </a:tc>
               </a:tr>
-              <a:tr h="208364">
+              <a:tr h="220430">
                 <a:tc gridSpan="2">
                   <a:txBody>
                     <a:bodyPr/>
@@ -7992,7 +8011,7 @@
                       </a:r>
                     </a:p>
                   </a:txBody>
-                  <a:tcPr marL="8767" marR="8767" marT="8767" marB="0" anchor="ctr">
+                  <a:tcPr marL="9267" marR="9267" marT="9267" marB="0" anchor="ctr">
                     <a:lnL w="6350" cap="flat" cmpd="sng" algn="ctr">
                       <a:solidFill>
                         <a:srgbClr val="000000"/>
@@ -8059,7 +8078,7 @@
                       </a:r>
                     </a:p>
                   </a:txBody>
-                  <a:tcPr marL="8767" marR="8767" marT="8767" marB="0" anchor="ctr">
+                  <a:tcPr marL="9267" marR="9267" marT="9267" marB="0" anchor="ctr">
                     <a:lnL w="6350" cap="flat" cmpd="sng" algn="ctr">
                       <a:solidFill>
                         <a:srgbClr val="000000"/>
@@ -8116,7 +8135,7 @@
                       </a:r>
                     </a:p>
                   </a:txBody>
-                  <a:tcPr marL="8767" marR="8767" marT="8767" marB="0" anchor="ctr">
+                  <a:tcPr marL="9267" marR="9267" marT="9267" marB="0" anchor="ctr">
                     <a:lnL w="6350" cap="flat" cmpd="sng" algn="ctr">
                       <a:solidFill>
                         <a:srgbClr val="000000"/>
@@ -8162,18 +8181,18 @@
                     <a:p>
                       <a:pPr algn="ctr" fontAlgn="ctr"/>
                       <a:r>
-                        <a:rPr lang="en-US" sz="1200" b="1" i="0" u="none" strike="noStrike">
+                        <a:rPr lang="is-IS" sz="1200" b="1" i="0" u="none" strike="noStrike">
                           <a:solidFill>
                             <a:srgbClr val="000000"/>
                           </a:solidFill>
                           <a:effectLst/>
                           <a:latin typeface="Calibri" charset="0"/>
                         </a:rPr>
-                        <a:t>1476</a:t>
+                        <a:t>1300</a:t>
                       </a:r>
                     </a:p>
                   </a:txBody>
-                  <a:tcPr marL="8767" marR="8767" marT="8767" marB="0" anchor="ctr">
+                  <a:tcPr marL="9267" marR="9267" marT="9267" marB="0" anchor="ctr">
                     <a:lnL w="6350" cap="flat" cmpd="sng" algn="ctr">
                       <a:solidFill>
                         <a:srgbClr val="000000"/>
@@ -8230,7 +8249,7 @@
                       </a:r>
                     </a:p>
                   </a:txBody>
-                  <a:tcPr marL="8767" marR="8767" marT="8767" marB="0" anchor="ctr">
+                  <a:tcPr marL="9267" marR="9267" marT="9267" marB="0" anchor="ctr">
                     <a:lnL w="6350" cap="flat" cmpd="sng" algn="ctr">
                       <a:solidFill>
                         <a:srgbClr val="000000"/>
@@ -8287,7 +8306,7 @@
                       </a:r>
                     </a:p>
                   </a:txBody>
-                  <a:tcPr marL="8767" marR="8767" marT="8767" marB="0" anchor="ctr">
+                  <a:tcPr marL="9267" marR="9267" marT="9267" marB="0" anchor="ctr">
                     <a:lnL w="6350" cap="flat" cmpd="sng" algn="ctr">
                       <a:solidFill>
                         <a:srgbClr val="000000"/>

</xml_diff>